<commit_message>
01.02 simulink ppt completed
</commit_message>
<xml_diff>
--- a/Simulink Source Control.pptx
+++ b/Simulink Source Control.pptx
@@ -21,10 +21,13 @@
     <p:sldId id="268" r:id="rId15"/>
     <p:sldId id="269" r:id="rId16"/>
     <p:sldId id="271" r:id="rId17"/>
-    <p:sldId id="270" r:id="rId18"/>
-    <p:sldId id="272" r:id="rId19"/>
-    <p:sldId id="273" r:id="rId20"/>
-    <p:sldId id="274" r:id="rId21"/>
+    <p:sldId id="275" r:id="rId18"/>
+    <p:sldId id="270" r:id="rId19"/>
+    <p:sldId id="276" r:id="rId20"/>
+    <p:sldId id="272" r:id="rId21"/>
+    <p:sldId id="273" r:id="rId22"/>
+    <p:sldId id="274" r:id="rId23"/>
+    <p:sldId id="277" r:id="rId24"/>
   </p:sldIdLst>
   <p:sldSz cx="9144000" cy="6858000" type="screen4x3"/>
   <p:notesSz cx="6858000" cy="9144000"/>
@@ -8735,11 +8738,7 @@
           <a:p>
             <a:r>
               <a:rPr lang="en-US" altLang="ko-KR" dirty="0" smtClean="0"/>
-              <a:t>Simulink </a:t>
-            </a:r>
-            <a:r>
-              <a:rPr lang="en-US" altLang="ko-KR" dirty="0" smtClean="0"/>
-              <a:t>Source Control</a:t>
+              <a:t>Simulink Source Control</a:t>
             </a:r>
             <a:endParaRPr lang="ko-KR" altLang="en-US" dirty="0"/>
           </a:p>
@@ -8767,6 +8766,13 @@
       </p:transition>
     </mc:Fallback>
   </mc:AlternateContent>
+  <p:timing>
+    <p:tnLst>
+      <p:par>
+        <p:cTn id="1" dur="indefinite" restart="never" nodeType="tmRoot"/>
+      </p:par>
+    </p:tnLst>
+  </p:timing>
 </p:sld>
 </file>
 
@@ -8977,7 +8983,6 @@
               <a:rPr lang="en-US" altLang="ko-KR" dirty="0" smtClean="0"/>
               <a:t>)</a:t>
             </a:r>
-            <a:endParaRPr lang="en-US" altLang="ko-KR" dirty="0" smtClean="0"/>
           </a:p>
           <a:p>
             <a:pPr>
@@ -9232,8 +9237,78 @@
               <a:buSzPct val="100000"/>
             </a:pPr>
             <a:r>
-              <a:rPr lang="ko-KR" altLang="en-US" dirty="0" smtClean="0"/>
-              <a:t>원하는 </a:t>
+              <a:rPr lang="en-US" altLang="ko-KR" dirty="0" smtClean="0"/>
+              <a:t>Highlight </a:t>
+            </a:r>
+            <a:r>
+              <a:rPr lang="ko-KR" altLang="en-US" dirty="0" smtClean="0"/>
+              <a:t>색 </a:t>
+            </a:r>
+            <a:r>
+              <a:rPr lang="en-US" altLang="ko-KR" dirty="0" smtClean="0"/>
+              <a:t>: </a:t>
+            </a:r>
+            <a:r>
+              <a:rPr lang="ko-KR" altLang="en-US" dirty="0" smtClean="0"/>
+              <a:t>파란색 </a:t>
+            </a:r>
+            <a:r>
+              <a:rPr lang="en-US" altLang="ko-KR" dirty="0" smtClean="0"/>
+              <a:t>: </a:t>
+            </a:r>
+            <a:r>
+              <a:rPr lang="ko-KR" altLang="en-US" dirty="0" smtClean="0"/>
+              <a:t>추가 </a:t>
+            </a:r>
+            <a:r>
+              <a:rPr lang="en-US" altLang="ko-KR" dirty="0" smtClean="0"/>
+              <a:t>/ </a:t>
+            </a:r>
+            <a:r>
+              <a:rPr lang="ko-KR" altLang="en-US" dirty="0" smtClean="0"/>
+              <a:t>보라색 </a:t>
+            </a:r>
+            <a:r>
+              <a:rPr lang="en-US" altLang="ko-KR" dirty="0" smtClean="0"/>
+              <a:t>: </a:t>
+            </a:r>
+            <a:r>
+              <a:rPr lang="ko-KR" altLang="en-US" dirty="0" smtClean="0"/>
+              <a:t>수정 </a:t>
+            </a:r>
+            <a:r>
+              <a:rPr lang="en-US" altLang="ko-KR" dirty="0" smtClean="0"/>
+              <a:t>/ </a:t>
+            </a:r>
+            <a:r>
+              <a:rPr lang="ko-KR" altLang="en-US" dirty="0" smtClean="0"/>
+              <a:t>주황색 </a:t>
+            </a:r>
+            <a:r>
+              <a:rPr lang="en-US" altLang="ko-KR" dirty="0" smtClean="0"/>
+              <a:t>: </a:t>
+            </a:r>
+            <a:r>
+              <a:rPr lang="ko-KR" altLang="en-US" dirty="0" smtClean="0"/>
+              <a:t>삭제</a:t>
+            </a:r>
+            <a:endParaRPr lang="en-US" altLang="ko-KR" dirty="0" smtClean="0"/>
+          </a:p>
+          <a:p>
+            <a:pPr lvl="1">
+              <a:buSzPct val="100000"/>
+            </a:pPr>
+            <a:r>
+              <a:rPr lang="ko-KR" altLang="en-US" dirty="0" smtClean="0"/>
+              <a:t>왼쪽 </a:t>
+            </a:r>
+            <a:r>
+              <a:rPr lang="en-US" altLang="ko-KR" dirty="0" smtClean="0"/>
+              <a:t>Tree</a:t>
+            </a:r>
+            <a:r>
+              <a:rPr lang="ko-KR" altLang="en-US" dirty="0" smtClean="0"/>
+              <a:t>에서 특정 </a:t>
             </a:r>
             <a:r>
               <a:rPr lang="en-US" altLang="ko-KR" dirty="0" smtClean="0"/>
@@ -9241,8 +9316,18 @@
             </a:r>
             <a:r>
               <a:rPr lang="ko-KR" altLang="en-US" dirty="0" smtClean="0"/>
-              <a:t>를 클릭하면 오른쪽 모델에 강조됨</a:t>
-            </a:r>
+              <a:t>를 클릭하면 오른쪽 모델에 </a:t>
+            </a:r>
+            <a:r>
+              <a:rPr lang="ko-KR" altLang="en-US" dirty="0" smtClean="0"/>
+              <a:t>강조됨</a:t>
+            </a:r>
+            <a:endParaRPr lang="en-US" altLang="ko-KR" dirty="0" smtClean="0"/>
+          </a:p>
+          <a:p>
+            <a:pPr lvl="1">
+              <a:buSzPct val="100000"/>
+            </a:pPr>
             <a:endParaRPr lang="en-US" altLang="ko-KR" dirty="0" smtClean="0"/>
           </a:p>
           <a:p>
@@ -9464,7 +9549,7 @@
             </a:r>
             <a:r>
               <a:rPr lang="en-US" altLang="ko-KR" dirty="0" smtClean="0"/>
-              <a:t>-&gt;</a:t>
+              <a:t>-&gt; ‘</a:t>
             </a:r>
             <a:r>
               <a:rPr lang="en-US" altLang="ko-KR" dirty="0" err="1" smtClean="0"/>
@@ -9472,7 +9557,15 @@
             </a:r>
             <a:r>
               <a:rPr lang="ko-KR" altLang="en-US" dirty="0" smtClean="0"/>
-              <a:t>을 사용하여 되돌리기 선택</a:t>
+              <a:t>을 사용하여 되돌리기</a:t>
+            </a:r>
+            <a:r>
+              <a:rPr lang="en-US" altLang="ko-KR" dirty="0" smtClean="0"/>
+              <a:t>’</a:t>
+            </a:r>
+            <a:r>
+              <a:rPr lang="ko-KR" altLang="en-US" dirty="0" smtClean="0"/>
+              <a:t> 선택</a:t>
             </a:r>
             <a:endParaRPr lang="en-US" altLang="ko-KR" dirty="0" smtClean="0"/>
           </a:p>
@@ -9528,9 +9621,12 @@
             </a:r>
             <a:r>
               <a:rPr lang="ko-KR" altLang="en-US" dirty="0" smtClean="0"/>
-              <a:t>                             를 사용하여 복원할 수 있음</a:t>
-            </a:r>
-            <a:endParaRPr lang="en-US" altLang="ko-KR" dirty="0" smtClean="0"/>
+              <a:t>                             를 사용하여 복원할 수 있다</a:t>
+            </a:r>
+            <a:r>
+              <a:rPr lang="en-US" altLang="ko-KR" dirty="0" smtClean="0"/>
+              <a:t>.</a:t>
+            </a:r>
           </a:p>
           <a:p>
             <a:pPr lvl="1">
@@ -9570,9 +9666,12 @@
             </a:r>
             <a:r>
               <a:rPr lang="ko-KR" altLang="en-US" dirty="0" smtClean="0"/>
-              <a:t>할 수 있음</a:t>
-            </a:r>
-            <a:endParaRPr lang="en-US" altLang="ko-KR" dirty="0" smtClean="0"/>
+              <a:t>할 수 있다</a:t>
+            </a:r>
+            <a:r>
+              <a:rPr lang="en-US" altLang="ko-KR" dirty="0" smtClean="0"/>
+              <a:t>.</a:t>
+            </a:r>
           </a:p>
           <a:p>
             <a:pPr lvl="1">
@@ -9583,16 +9682,16 @@
               <a:t>전체 </a:t>
             </a:r>
             <a:r>
-              <a:rPr lang="en-US" altLang="ko-KR" dirty="0" err="1" smtClean="0"/>
-              <a:t>simulink</a:t>
-            </a:r>
-            <a:r>
-              <a:rPr lang="en-US" altLang="ko-KR" dirty="0" smtClean="0"/>
-              <a:t> project</a:t>
-            </a:r>
-            <a:r>
-              <a:rPr lang="ko-KR" altLang="en-US" dirty="0" smtClean="0"/>
-              <a:t>를 특정 버전으로 되돌리는 기능은 없고</a:t>
+              <a:rPr lang="en-US" altLang="ko-KR" dirty="0" smtClean="0"/>
+              <a:t>Simulink project</a:t>
+            </a:r>
+            <a:r>
+              <a:rPr lang="ko-KR" altLang="en-US" dirty="0" smtClean="0"/>
+              <a:t>를 특정 버전으로 되돌리는 기능은 없으</a:t>
+            </a:r>
+            <a:r>
+              <a:rPr lang="ko-KR" altLang="en-US" dirty="0"/>
+              <a:t>며</a:t>
             </a:r>
             <a:r>
               <a:rPr lang="en-US" altLang="ko-KR" dirty="0" smtClean="0"/>
@@ -9600,9 +9699,12 @@
             </a:r>
             <a:r>
               <a:rPr lang="ko-KR" altLang="en-US" dirty="0" smtClean="0"/>
-              <a:t>하나의 파일만 되돌릴 수 있음</a:t>
-            </a:r>
-            <a:endParaRPr lang="en-US" altLang="ko-KR" dirty="0" smtClean="0"/>
+              <a:t>하나의 파일만 되돌릴 수 있다</a:t>
+            </a:r>
+            <a:r>
+              <a:rPr lang="en-US" altLang="ko-KR" dirty="0" smtClean="0"/>
+              <a:t>.</a:t>
+            </a:r>
           </a:p>
         </p:txBody>
       </p:sp>
@@ -9862,7 +9964,19 @@
             </a:r>
             <a:r>
               <a:rPr lang="ko-KR" altLang="en-US" dirty="0" smtClean="0"/>
-              <a:t>모두 변경되어 충돌이 발생하였다고 표시됨 </a:t>
+              <a:t>모두 변경되어 충돌이 발생하였다고 </a:t>
+            </a:r>
+            <a:r>
+              <a:rPr lang="ko-KR" altLang="en-US" dirty="0" smtClean="0"/>
+              <a:t>표시된다</a:t>
+            </a:r>
+            <a:r>
+              <a:rPr lang="en-US" altLang="ko-KR" dirty="0" smtClean="0"/>
+              <a:t>.</a:t>
+            </a:r>
+            <a:r>
+              <a:rPr lang="ko-KR" altLang="en-US" dirty="0" smtClean="0"/>
+              <a:t> </a:t>
             </a:r>
             <a:r>
               <a:rPr lang="en-US" altLang="ko-KR" dirty="0" smtClean="0"/>
@@ -9904,108 +10018,6 @@
               <a:buSzPct val="100000"/>
             </a:pPr>
             <a:endParaRPr lang="en-US" altLang="ko-KR" dirty="0" smtClean="0"/>
-          </a:p>
-          <a:p>
-            <a:pPr lvl="1">
-              <a:buSzPct val="100000"/>
-            </a:pPr>
-            <a:endParaRPr lang="en-US" altLang="ko-KR" dirty="0"/>
-          </a:p>
-          <a:p>
-            <a:pPr>
-              <a:buSzPct val="100000"/>
-            </a:pPr>
-            <a:endParaRPr lang="en-US" altLang="ko-KR" dirty="0"/>
-          </a:p>
-          <a:p>
-            <a:pPr lvl="1">
-              <a:buSzPct val="100000"/>
-            </a:pPr>
-            <a:endParaRPr lang="en-US" altLang="ko-KR" dirty="0" smtClean="0"/>
-          </a:p>
-          <a:p>
-            <a:pPr lvl="1">
-              <a:buSzPct val="100000"/>
-            </a:pPr>
-            <a:endParaRPr lang="en-US" altLang="ko-KR" dirty="0"/>
-          </a:p>
-          <a:p>
-            <a:pPr lvl="1">
-              <a:buSzPct val="100000"/>
-            </a:pPr>
-            <a:endParaRPr lang="en-US" altLang="ko-KR" dirty="0" smtClean="0"/>
-          </a:p>
-          <a:p>
-            <a:pPr lvl="1">
-              <a:buSzPct val="100000"/>
-            </a:pPr>
-            <a:endParaRPr lang="en-US" altLang="ko-KR" dirty="0"/>
-          </a:p>
-          <a:p>
-            <a:pPr lvl="1">
-              <a:buSzPct val="100000"/>
-            </a:pPr>
-            <a:endParaRPr lang="en-US" altLang="ko-KR" dirty="0" smtClean="0"/>
-          </a:p>
-          <a:p>
-            <a:pPr lvl="1">
-              <a:buSzPct val="100000"/>
-            </a:pPr>
-            <a:endParaRPr lang="en-US" altLang="ko-KR" dirty="0"/>
-          </a:p>
-          <a:p>
-            <a:pPr lvl="1">
-              <a:buSzPct val="100000"/>
-            </a:pPr>
-            <a:endParaRPr lang="en-US" altLang="ko-KR" dirty="0" smtClean="0"/>
-          </a:p>
-          <a:p>
-            <a:pPr lvl="1">
-              <a:buSzPct val="100000"/>
-            </a:pPr>
-            <a:r>
-              <a:rPr lang="ko-KR" altLang="en-US" dirty="0" smtClean="0"/>
-              <a:t>원하는 </a:t>
-            </a:r>
-            <a:r>
-              <a:rPr lang="en-US" altLang="ko-KR" dirty="0" smtClean="0"/>
-              <a:t>component</a:t>
-            </a:r>
-            <a:r>
-              <a:rPr lang="ko-KR" altLang="en-US" dirty="0" smtClean="0"/>
-              <a:t>를 클릭하면 오른쪽 모델에 강조됨</a:t>
-            </a:r>
-            <a:endParaRPr lang="en-US" altLang="ko-KR" dirty="0" smtClean="0"/>
-          </a:p>
-          <a:p>
-            <a:pPr>
-              <a:buSzPct val="100000"/>
-            </a:pPr>
-            <a:endParaRPr lang="en-US" altLang="ko-KR" dirty="0" smtClean="0"/>
-          </a:p>
-          <a:p>
-            <a:pPr lvl="1">
-              <a:buSzPct val="100000"/>
-            </a:pPr>
-            <a:endParaRPr lang="en-US" altLang="ko-KR" dirty="0"/>
-          </a:p>
-          <a:p>
-            <a:pPr lvl="1">
-              <a:buSzPct val="100000"/>
-            </a:pPr>
-            <a:endParaRPr lang="en-US" altLang="ko-KR" dirty="0" smtClean="0"/>
-          </a:p>
-          <a:p>
-            <a:pPr lvl="1">
-              <a:buSzPct val="100000"/>
-            </a:pPr>
-            <a:endParaRPr lang="en-US" altLang="ko-KR" dirty="0"/>
-          </a:p>
-          <a:p>
-            <a:pPr lvl="1">
-              <a:buSzPct val="100000"/>
-            </a:pPr>
-            <a:endParaRPr lang="en-US" altLang="ko-KR" dirty="0"/>
           </a:p>
           <a:p>
             <a:pPr lvl="1">
@@ -10853,7 +10865,12 @@
             <p:ph sz="half" idx="10"/>
           </p:nvPr>
         </p:nvSpPr>
-        <p:spPr/>
+        <p:spPr>
+          <a:xfrm>
+            <a:off x="179512" y="747830"/>
+            <a:ext cx="8482356" cy="5387542"/>
+          </a:xfrm>
+        </p:spPr>
         <p:txBody>
           <a:bodyPr/>
           <a:lstStyle/>
@@ -10892,147 +10909,97 @@
             <a:pPr lvl="1">
               <a:buSzPct val="100000"/>
             </a:pPr>
+            <a:r>
+              <a:rPr lang="ko-KR" altLang="en-US" dirty="0" smtClean="0"/>
+              <a:t>충돌 보기를 하였을 시</a:t>
+            </a:r>
+            <a:r>
+              <a:rPr lang="en-US" altLang="ko-KR" dirty="0" smtClean="0"/>
+              <a:t>, </a:t>
+            </a:r>
+            <a:r>
+              <a:rPr lang="en-US" altLang="ko-KR" dirty="0" err="1" smtClean="0"/>
+              <a:t>simulink</a:t>
+            </a:r>
+            <a:r>
+              <a:rPr lang="ko-KR" altLang="en-US" dirty="0" smtClean="0"/>
+              <a:t>에서 자동으로 </a:t>
+            </a:r>
+            <a:r>
+              <a:rPr lang="en-US" altLang="ko-KR" dirty="0" smtClean="0"/>
+              <a:t/>
+            </a:r>
+            <a:br>
+              <a:rPr lang="en-US" altLang="ko-KR" dirty="0" smtClean="0"/>
+            </a:br>
+            <a:r>
+              <a:rPr lang="ko-KR" altLang="en-US" dirty="0" smtClean="0"/>
+              <a:t>해결한 </a:t>
+            </a:r>
+            <a:r>
+              <a:rPr lang="en-US" altLang="ko-KR" dirty="0" smtClean="0"/>
+              <a:t>target file</a:t>
+            </a:r>
+            <a:r>
+              <a:rPr lang="ko-KR" altLang="en-US" dirty="0" smtClean="0"/>
+              <a:t>이 위 그림과 같다</a:t>
+            </a:r>
+            <a:r>
+              <a:rPr lang="en-US" altLang="ko-KR" dirty="0" smtClean="0"/>
+              <a:t>.</a:t>
+            </a:r>
+          </a:p>
+          <a:p>
+            <a:pPr lvl="1">
+              <a:buSzPct val="100000"/>
+            </a:pPr>
+            <a:r>
+              <a:rPr lang="en-US" altLang="ko-KR" dirty="0" smtClean="0"/>
+              <a:t>3-way merge</a:t>
+            </a:r>
+            <a:r>
+              <a:rPr lang="ko-KR" altLang="en-US" dirty="0" smtClean="0"/>
+              <a:t>를 사용하여 </a:t>
+            </a:r>
+            <a:r>
+              <a:rPr lang="en-US" altLang="ko-KR" dirty="0" smtClean="0"/>
+              <a:t>base</a:t>
+            </a:r>
+            <a:r>
+              <a:rPr lang="ko-KR" altLang="en-US" dirty="0" smtClean="0"/>
+              <a:t>와 모두 다른 </a:t>
+            </a:r>
+            <a:r>
+              <a:rPr lang="en-US" altLang="ko-KR" dirty="0" smtClean="0"/>
+              <a:t/>
+            </a:r>
+            <a:br>
+              <a:rPr lang="en-US" altLang="ko-KR" dirty="0" smtClean="0"/>
+            </a:br>
+            <a:r>
+              <a:rPr lang="en-US" altLang="ko-KR" dirty="0" smtClean="0"/>
+              <a:t>component</a:t>
+            </a:r>
+            <a:r>
+              <a:rPr lang="ko-KR" altLang="en-US" dirty="0" smtClean="0"/>
+              <a:t>에 대해서 랜덤적으로 선택한</a:t>
+            </a:r>
+            <a:r>
+              <a:rPr lang="en-US" altLang="ko-KR" dirty="0" smtClean="0"/>
+              <a:t/>
+            </a:r>
+            <a:br>
+              <a:rPr lang="en-US" altLang="ko-KR" dirty="0" smtClean="0"/>
+            </a:br>
+            <a:r>
+              <a:rPr lang="ko-KR" altLang="en-US" dirty="0" smtClean="0"/>
+              <a:t> 결과이다</a:t>
+            </a:r>
+            <a:r>
+              <a:rPr lang="en-US" altLang="ko-KR" dirty="0" smtClean="0"/>
+              <a:t>.</a:t>
+            </a:r>
             <a:endParaRPr lang="en-US" altLang="ko-KR" dirty="0"/>
-          </a:p>
-          <a:p>
-            <a:pPr lvl="1">
-              <a:buSzPct val="100000"/>
-            </a:pPr>
-            <a:endParaRPr lang="en-US" altLang="ko-KR" dirty="0" smtClean="0"/>
-          </a:p>
-          <a:p>
-            <a:pPr lvl="1">
-              <a:buSzPct val="100000"/>
-            </a:pPr>
-            <a:endParaRPr lang="en-US" altLang="ko-KR" dirty="0"/>
-          </a:p>
-          <a:p>
-            <a:pPr lvl="1">
-              <a:buSzPct val="100000"/>
-            </a:pPr>
-            <a:endParaRPr lang="en-US" altLang="ko-KR" dirty="0" smtClean="0"/>
-          </a:p>
-          <a:p>
-            <a:pPr lvl="1">
-              <a:buSzPct val="100000"/>
-            </a:pPr>
-            <a:r>
-              <a:rPr lang="ko-KR" altLang="en-US" dirty="0" smtClean="0"/>
-              <a:t>개발자의 의도에 맞게 </a:t>
-            </a:r>
-            <a:r>
-              <a:rPr lang="en-US" altLang="ko-KR" dirty="0" smtClean="0"/>
-              <a:t>target</a:t>
-            </a:r>
-            <a:r>
-              <a:rPr lang="ko-KR" altLang="en-US" dirty="0"/>
-              <a:t> </a:t>
-            </a:r>
-            <a:r>
-              <a:rPr lang="en-US" altLang="ko-KR" dirty="0" smtClean="0"/>
-              <a:t>model</a:t>
-            </a:r>
-            <a:r>
-              <a:rPr lang="ko-KR" altLang="en-US" dirty="0" smtClean="0"/>
-              <a:t>에서 </a:t>
-            </a:r>
-            <a:r>
-              <a:rPr lang="en-US" altLang="ko-KR" dirty="0" smtClean="0"/>
-              <a:t>Mine</a:t>
-            </a:r>
-            <a:r>
-              <a:rPr lang="ko-KR" altLang="en-US" dirty="0" smtClean="0"/>
-              <a:t>과 </a:t>
-            </a:r>
-            <a:r>
-              <a:rPr lang="en-US" altLang="ko-KR" dirty="0" smtClean="0"/>
-              <a:t>Theirs</a:t>
-            </a:r>
-            <a:r>
-              <a:rPr lang="ko-KR" altLang="en-US" dirty="0" smtClean="0"/>
-              <a:t>중에 어떤 변경사항을 채택할 지 선택할 수 있음</a:t>
-            </a:r>
-            <a:endParaRPr lang="en-US" altLang="ko-KR" dirty="0" smtClean="0"/>
-          </a:p>
-          <a:p>
-            <a:pPr lvl="1">
-              <a:buSzPct val="100000"/>
-            </a:pPr>
-            <a:r>
-              <a:rPr lang="ko-KR" altLang="en-US" dirty="0" smtClean="0"/>
-              <a:t>직접 오른쪽의 </a:t>
-            </a:r>
-            <a:r>
-              <a:rPr lang="en-US" altLang="ko-KR" dirty="0" smtClean="0"/>
-              <a:t>target</a:t>
-            </a:r>
-            <a:r>
-              <a:rPr lang="ko-KR" altLang="en-US" dirty="0"/>
-              <a:t> </a:t>
-            </a:r>
-            <a:r>
-              <a:rPr lang="en-US" altLang="ko-KR" dirty="0" smtClean="0"/>
-              <a:t>model</a:t>
-            </a:r>
-            <a:r>
-              <a:rPr lang="ko-KR" altLang="en-US" dirty="0" smtClean="0"/>
-              <a:t>을 수정하여 </a:t>
-            </a:r>
-            <a:r>
-              <a:rPr lang="en-US" altLang="ko-KR" dirty="0" smtClean="0"/>
-              <a:t>merge</a:t>
-            </a:r>
-            <a:r>
-              <a:rPr lang="ko-KR" altLang="en-US" dirty="0" smtClean="0"/>
-              <a:t>할 수도 있음</a:t>
-            </a:r>
-            <a:endParaRPr lang="en-US" altLang="ko-KR" dirty="0" smtClean="0"/>
-          </a:p>
-          <a:p>
-            <a:pPr lvl="1">
-              <a:buSzPct val="100000"/>
-            </a:pPr>
-            <a:r>
-              <a:rPr lang="en-US" altLang="ko-KR" dirty="0" smtClean="0"/>
-              <a:t>Target model</a:t>
-            </a:r>
-            <a:r>
-              <a:rPr lang="ko-KR" altLang="en-US" dirty="0" smtClean="0"/>
-              <a:t> 수정이 완료 하였으면 </a:t>
-            </a:r>
-            <a:r>
-              <a:rPr lang="en-US" altLang="ko-KR" dirty="0" smtClean="0"/>
-              <a:t>‘</a:t>
-            </a:r>
-            <a:r>
-              <a:rPr lang="ko-KR" altLang="en-US" dirty="0" smtClean="0"/>
-              <a:t>적용 후 닫기</a:t>
-            </a:r>
-            <a:r>
-              <a:rPr lang="en-US" altLang="ko-KR" dirty="0" smtClean="0"/>
-              <a:t>’</a:t>
-            </a:r>
-            <a:r>
-              <a:rPr lang="ko-KR" altLang="en-US" dirty="0" smtClean="0"/>
-              <a:t>를</a:t>
-            </a:r>
-            <a:r>
-              <a:rPr lang="en-US" altLang="ko-KR" dirty="0"/>
-              <a:t> </a:t>
-            </a:r>
-            <a:r>
-              <a:rPr lang="ko-KR" altLang="en-US" dirty="0" smtClean="0"/>
-              <a:t>하여 </a:t>
-            </a:r>
-            <a:r>
-              <a:rPr lang="en-US" altLang="ko-KR" dirty="0" smtClean="0"/>
-              <a:t>merge </a:t>
-            </a:r>
-            <a:r>
-              <a:rPr lang="ko-KR" altLang="en-US" dirty="0" smtClean="0"/>
-              <a:t>완료</a:t>
-            </a:r>
-            <a:endParaRPr lang="en-US" altLang="ko-KR" dirty="0" smtClean="0"/>
           </a:p>
         </p:txBody>
       </p:sp>
@@ -11053,7 +11020,503 @@
           <a:p>
             <a:r>
               <a:rPr lang="en-US" altLang="ko-KR" dirty="0" smtClean="0"/>
-              <a:t>6. Merge(IV)</a:t>
+              <a:t>6. </a:t>
+            </a:r>
+            <a:r>
+              <a:rPr lang="en-US" altLang="ko-KR" dirty="0" smtClean="0"/>
+              <a:t>Merge(</a:t>
+            </a:r>
+            <a:r>
+              <a:rPr lang="en-US" altLang="ko-KR" dirty="0" smtClean="0"/>
+              <a:t>IV</a:t>
+            </a:r>
+            <a:r>
+              <a:rPr lang="en-US" altLang="ko-KR" dirty="0" smtClean="0"/>
+              <a:t>)</a:t>
+            </a:r>
+            <a:endParaRPr lang="ko-KR" altLang="en-US" dirty="0"/>
+          </a:p>
+        </p:txBody>
+      </p:sp>
+      <p:pic>
+        <p:nvPicPr>
+          <p:cNvPr id="2050" name="Picture 2"/>
+          <p:cNvPicPr>
+            <a:picLocks noChangeAspect="1" noChangeArrowheads="1"/>
+          </p:cNvPicPr>
+          <p:nvPr/>
+        </p:nvPicPr>
+        <p:blipFill>
+          <a:blip r:embed="rId2">
+            <a:extLst>
+              <a:ext uri="{28A0092B-C50C-407E-A947-70E740481C1C}">
+                <a14:useLocalDpi xmlns:a14="http://schemas.microsoft.com/office/drawing/2010/main" val="0"/>
+              </a:ext>
+            </a:extLst>
+          </a:blip>
+          <a:srcRect/>
+          <a:stretch>
+            <a:fillRect/>
+          </a:stretch>
+        </p:blipFill>
+        <p:spPr bwMode="auto">
+          <a:xfrm>
+            <a:off x="5220072" y="659025"/>
+            <a:ext cx="3923928" cy="5756143"/>
+          </a:xfrm>
+          <a:prstGeom prst="rect">
+            <a:avLst/>
+          </a:prstGeom>
+          <a:noFill/>
+          <a:ln>
+            <a:noFill/>
+          </a:ln>
+          <a:extLst>
+            <a:ext uri="{909E8E84-426E-40DD-AFC4-6F175D3DCCD1}">
+              <a14:hiddenFill xmlns:a14="http://schemas.microsoft.com/office/drawing/2010/main">
+                <a:solidFill>
+                  <a:schemeClr val="accent1"/>
+                </a:solidFill>
+              </a14:hiddenFill>
+            </a:ext>
+            <a:ext uri="{91240B29-F687-4F45-9708-019B960494DF}">
+              <a14:hiddenLine xmlns:a14="http://schemas.microsoft.com/office/drawing/2010/main" w="9525">
+                <a:solidFill>
+                  <a:schemeClr val="tx1"/>
+                </a:solidFill>
+                <a:miter lim="800000"/>
+                <a:headEnd/>
+                <a:tailEnd/>
+              </a14:hiddenLine>
+            </a:ext>
+          </a:extLst>
+        </p:spPr>
+      </p:pic>
+      <p:sp>
+        <p:nvSpPr>
+          <p:cNvPr id="4" name="TextBox 3"/>
+          <p:cNvSpPr txBox="1"/>
+          <p:nvPr/>
+        </p:nvSpPr>
+        <p:spPr>
+          <a:xfrm>
+            <a:off x="6425633" y="6088759"/>
+            <a:ext cx="2736304" cy="338554"/>
+          </a:xfrm>
+          <a:prstGeom prst="rect">
+            <a:avLst/>
+          </a:prstGeom>
+          <a:noFill/>
+        </p:spPr>
+        <p:txBody>
+          <a:bodyPr wrap="square" rtlCol="0">
+            <a:spAutoFit/>
+          </a:bodyPr>
+          <a:lstStyle/>
+          <a:p>
+            <a:r>
+              <a:rPr lang="en-US" altLang="ko-KR" sz="1600" b="1" dirty="0" smtClean="0">
+                <a:latin typeface="Arial" panose="020B0604020202020204" pitchFamily="34" charset="0"/>
+                <a:cs typeface="Arial" panose="020B0604020202020204" pitchFamily="34" charset="0"/>
+              </a:rPr>
+              <a:t>Theirs / Mine files</a:t>
+            </a:r>
+            <a:endParaRPr lang="ko-KR" altLang="en-US" sz="1600" b="1" dirty="0" smtClean="0">
+              <a:latin typeface="Arial" panose="020B0604020202020204" pitchFamily="34" charset="0"/>
+              <a:cs typeface="Arial" panose="020B0604020202020204" pitchFamily="34" charset="0"/>
+            </a:endParaRPr>
+          </a:p>
+        </p:txBody>
+      </p:sp>
+      <p:pic>
+        <p:nvPicPr>
+          <p:cNvPr id="2052" name="Picture 4"/>
+          <p:cNvPicPr>
+            <a:picLocks noChangeAspect="1" noChangeArrowheads="1"/>
+          </p:cNvPicPr>
+          <p:nvPr/>
+        </p:nvPicPr>
+        <p:blipFill>
+          <a:blip r:embed="rId3">
+            <a:extLst>
+              <a:ext uri="{28A0092B-C50C-407E-A947-70E740481C1C}">
+                <a14:useLocalDpi xmlns:a14="http://schemas.microsoft.com/office/drawing/2010/main" val="0"/>
+              </a:ext>
+            </a:extLst>
+          </a:blip>
+          <a:srcRect/>
+          <a:stretch>
+            <a:fillRect/>
+          </a:stretch>
+        </p:blipFill>
+        <p:spPr bwMode="auto">
+          <a:xfrm>
+            <a:off x="251520" y="675292"/>
+            <a:ext cx="4629150" cy="2076450"/>
+          </a:xfrm>
+          <a:prstGeom prst="rect">
+            <a:avLst/>
+          </a:prstGeom>
+          <a:noFill/>
+          <a:ln>
+            <a:noFill/>
+          </a:ln>
+          <a:extLst>
+            <a:ext uri="{909E8E84-426E-40DD-AFC4-6F175D3DCCD1}">
+              <a14:hiddenFill xmlns:a14="http://schemas.microsoft.com/office/drawing/2010/main">
+                <a:solidFill>
+                  <a:schemeClr val="accent1"/>
+                </a:solidFill>
+              </a14:hiddenFill>
+            </a:ext>
+            <a:ext uri="{91240B29-F687-4F45-9708-019B960494DF}">
+              <a14:hiddenLine xmlns:a14="http://schemas.microsoft.com/office/drawing/2010/main" w="9525">
+                <a:solidFill>
+                  <a:schemeClr val="tx1"/>
+                </a:solidFill>
+                <a:miter lim="800000"/>
+                <a:headEnd/>
+                <a:tailEnd/>
+              </a14:hiddenLine>
+            </a:ext>
+          </a:extLst>
+        </p:spPr>
+      </p:pic>
+      <p:sp>
+        <p:nvSpPr>
+          <p:cNvPr id="9" name="TextBox 8"/>
+          <p:cNvSpPr txBox="1"/>
+          <p:nvPr/>
+        </p:nvSpPr>
+        <p:spPr>
+          <a:xfrm>
+            <a:off x="2195736" y="2442896"/>
+            <a:ext cx="2736304" cy="338554"/>
+          </a:xfrm>
+          <a:prstGeom prst="rect">
+            <a:avLst/>
+          </a:prstGeom>
+          <a:noFill/>
+        </p:spPr>
+        <p:txBody>
+          <a:bodyPr wrap="square" rtlCol="0">
+            <a:spAutoFit/>
+          </a:bodyPr>
+          <a:lstStyle/>
+          <a:p>
+            <a:r>
+              <a:rPr lang="en-US" altLang="ko-KR" sz="1600" b="1" dirty="0" smtClean="0">
+                <a:latin typeface="Arial" panose="020B0604020202020204" pitchFamily="34" charset="0"/>
+                <a:cs typeface="Arial" panose="020B0604020202020204" pitchFamily="34" charset="0"/>
+              </a:rPr>
+              <a:t>Target file</a:t>
+            </a:r>
+            <a:endParaRPr lang="ko-KR" altLang="en-US" sz="1600" b="1" dirty="0" smtClean="0">
+              <a:latin typeface="Arial" panose="020B0604020202020204" pitchFamily="34" charset="0"/>
+              <a:cs typeface="Arial" panose="020B0604020202020204" pitchFamily="34" charset="0"/>
+            </a:endParaRPr>
+          </a:p>
+        </p:txBody>
+      </p:sp>
+    </p:spTree>
+    <p:extLst>
+      <p:ext uri="{BB962C8B-B14F-4D97-AF65-F5344CB8AC3E}">
+        <p14:creationId xmlns:p14="http://schemas.microsoft.com/office/powerpoint/2010/main" val="3071166349"/>
+      </p:ext>
+    </p:extLst>
+  </p:cSld>
+  <p:clrMapOvr>
+    <a:masterClrMapping/>
+  </p:clrMapOvr>
+  <mc:AlternateContent xmlns:mc="http://schemas.openxmlformats.org/markup-compatibility/2006" xmlns:p14="http://schemas.microsoft.com/office/powerpoint/2010/main">
+    <mc:Choice Requires="p14">
+      <p:transition p14:dur="300">
+        <p:fade/>
+      </p:transition>
+    </mc:Choice>
+    <mc:Fallback xmlns="">
+      <p:transition>
+        <p:fade/>
+      </p:transition>
+    </mc:Fallback>
+  </mc:AlternateContent>
+</p:sld>
+</file>
+
+<file path=ppt/slides/slide17.xml><?xml version="1.0" encoding="utf-8"?>
+<p:sld xmlns:a="http://schemas.openxmlformats.org/drawingml/2006/main" xmlns:r="http://schemas.openxmlformats.org/officeDocument/2006/relationships" xmlns:p="http://schemas.openxmlformats.org/presentationml/2006/main">
+  <p:cSld>
+    <p:spTree>
+      <p:nvGrpSpPr>
+        <p:cNvPr id="1" name=""/>
+        <p:cNvGrpSpPr/>
+        <p:nvPr/>
+      </p:nvGrpSpPr>
+      <p:grpSpPr>
+        <a:xfrm>
+          <a:off x="0" y="0"/>
+          <a:ext cx="0" cy="0"/>
+          <a:chOff x="0" y="0"/>
+          <a:chExt cx="0" cy="0"/>
+        </a:xfrm>
+      </p:grpSpPr>
+      <p:sp>
+        <p:nvSpPr>
+          <p:cNvPr id="2" name="내용 개체 틀 1"/>
+          <p:cNvSpPr>
+            <a:spLocks noGrp="1"/>
+          </p:cNvSpPr>
+          <p:nvPr>
+            <p:ph sz="half" idx="10"/>
+          </p:nvPr>
+        </p:nvSpPr>
+        <p:spPr/>
+        <p:txBody>
+          <a:bodyPr/>
+          <a:lstStyle/>
+          <a:p>
+            <a:pPr marL="0" indent="0">
+              <a:buSzPct val="100000"/>
+              <a:buNone/>
+            </a:pPr>
+            <a:endParaRPr lang="en-US" altLang="ko-KR" dirty="0" smtClean="0"/>
+          </a:p>
+          <a:p>
+            <a:pPr lvl="1">
+              <a:buSzPct val="100000"/>
+            </a:pPr>
+            <a:endParaRPr lang="en-US" altLang="ko-KR" dirty="0"/>
+          </a:p>
+          <a:p>
+            <a:pPr lvl="1">
+              <a:buSzPct val="100000"/>
+            </a:pPr>
+            <a:endParaRPr lang="en-US" altLang="ko-KR" dirty="0" smtClean="0"/>
+          </a:p>
+          <a:p>
+            <a:pPr lvl="1">
+              <a:buSzPct val="100000"/>
+            </a:pPr>
+            <a:endParaRPr lang="en-US" altLang="ko-KR" dirty="0"/>
+          </a:p>
+          <a:p>
+            <a:pPr lvl="1">
+              <a:buSzPct val="100000"/>
+            </a:pPr>
+            <a:endParaRPr lang="en-US" altLang="ko-KR" dirty="0" smtClean="0"/>
+          </a:p>
+          <a:p>
+            <a:pPr lvl="1">
+              <a:buSzPct val="100000"/>
+            </a:pPr>
+            <a:endParaRPr lang="en-US" altLang="ko-KR" dirty="0"/>
+          </a:p>
+          <a:p>
+            <a:pPr lvl="1">
+              <a:buSzPct val="100000"/>
+            </a:pPr>
+            <a:endParaRPr lang="en-US" altLang="ko-KR" dirty="0" smtClean="0"/>
+          </a:p>
+          <a:p>
+            <a:pPr lvl="1">
+              <a:buSzPct val="100000"/>
+            </a:pPr>
+            <a:endParaRPr lang="en-US" altLang="ko-KR" dirty="0"/>
+          </a:p>
+          <a:p>
+            <a:pPr lvl="1">
+              <a:buSzPct val="100000"/>
+            </a:pPr>
+            <a:endParaRPr lang="en-US" altLang="ko-KR" dirty="0" smtClean="0"/>
+          </a:p>
+          <a:p>
+            <a:pPr lvl="1">
+              <a:buSzPct val="100000"/>
+            </a:pPr>
+            <a:r>
+              <a:rPr lang="ko-KR" altLang="en-US" dirty="0" smtClean="0"/>
+              <a:t>개발자의 의도에 맞게 </a:t>
+            </a:r>
+            <a:r>
+              <a:rPr lang="en-US" altLang="ko-KR" dirty="0" smtClean="0"/>
+              <a:t>target</a:t>
+            </a:r>
+            <a:r>
+              <a:rPr lang="ko-KR" altLang="en-US" dirty="0"/>
+              <a:t> </a:t>
+            </a:r>
+            <a:r>
+              <a:rPr lang="en-US" altLang="ko-KR" dirty="0" smtClean="0"/>
+              <a:t>model</a:t>
+            </a:r>
+            <a:r>
+              <a:rPr lang="ko-KR" altLang="en-US" dirty="0" smtClean="0"/>
+              <a:t>에서 </a:t>
+            </a:r>
+            <a:r>
+              <a:rPr lang="en-US" altLang="ko-KR" dirty="0" smtClean="0"/>
+              <a:t>Mine</a:t>
+            </a:r>
+            <a:r>
+              <a:rPr lang="ko-KR" altLang="en-US" dirty="0" smtClean="0"/>
+              <a:t>과 </a:t>
+            </a:r>
+            <a:r>
+              <a:rPr lang="en-US" altLang="ko-KR" dirty="0" smtClean="0"/>
+              <a:t>Theirs</a:t>
+            </a:r>
+            <a:r>
+              <a:rPr lang="ko-KR" altLang="en-US" dirty="0" smtClean="0"/>
+              <a:t>중</a:t>
+            </a:r>
+            <a:r>
+              <a:rPr lang="ko-KR" altLang="en-US" dirty="0"/>
+              <a:t>에</a:t>
+            </a:r>
+            <a:r>
+              <a:rPr lang="ko-KR" altLang="en-US" dirty="0" smtClean="0"/>
+              <a:t> 어떤 변경사항을 채택할 지 선택할 수 있다</a:t>
+            </a:r>
+            <a:r>
+              <a:rPr lang="en-US" altLang="ko-KR" dirty="0" smtClean="0"/>
+              <a:t>.</a:t>
+            </a:r>
+          </a:p>
+          <a:p>
+            <a:pPr lvl="1">
+              <a:buSzPct val="100000"/>
+            </a:pPr>
+            <a:r>
+              <a:rPr lang="ko-KR" altLang="en-US" dirty="0" smtClean="0"/>
+              <a:t>직접 오른쪽의 </a:t>
+            </a:r>
+            <a:r>
+              <a:rPr lang="en-US" altLang="ko-KR" dirty="0" smtClean="0"/>
+              <a:t>target</a:t>
+            </a:r>
+            <a:r>
+              <a:rPr lang="ko-KR" altLang="en-US" dirty="0"/>
+              <a:t> </a:t>
+            </a:r>
+            <a:r>
+              <a:rPr lang="en-US" altLang="ko-KR" dirty="0" smtClean="0"/>
+              <a:t>model</a:t>
+            </a:r>
+            <a:r>
+              <a:rPr lang="ko-KR" altLang="en-US" dirty="0" smtClean="0"/>
+              <a:t>을 수정하여 </a:t>
+            </a:r>
+            <a:r>
+              <a:rPr lang="en-US" altLang="ko-KR" dirty="0" smtClean="0"/>
+              <a:t>merge</a:t>
+            </a:r>
+            <a:r>
+              <a:rPr lang="ko-KR" altLang="en-US" dirty="0" smtClean="0"/>
+              <a:t>할 수도 있다</a:t>
+            </a:r>
+            <a:r>
+              <a:rPr lang="en-US" altLang="ko-KR" dirty="0" smtClean="0"/>
+              <a:t>.</a:t>
+            </a:r>
+          </a:p>
+          <a:p>
+            <a:pPr lvl="1">
+              <a:buSzPct val="100000"/>
+            </a:pPr>
+            <a:r>
+              <a:rPr lang="en-US" altLang="ko-KR" dirty="0" smtClean="0"/>
+              <a:t>Target </a:t>
+            </a:r>
+            <a:r>
+              <a:rPr lang="en-US" altLang="ko-KR" dirty="0" smtClean="0"/>
+              <a:t>model</a:t>
+            </a:r>
+            <a:r>
+              <a:rPr lang="ko-KR" altLang="en-US" dirty="0" smtClean="0"/>
+              <a:t>수정을 한 후</a:t>
+            </a:r>
+            <a:r>
+              <a:rPr lang="ko-KR" altLang="en-US" dirty="0" smtClean="0"/>
+              <a:t> </a:t>
+            </a:r>
+            <a:r>
+              <a:rPr lang="en-US" altLang="ko-KR" dirty="0" smtClean="0"/>
+              <a:t>‘</a:t>
+            </a:r>
+            <a:r>
+              <a:rPr lang="ko-KR" altLang="en-US" dirty="0" smtClean="0"/>
+              <a:t>적용 후 닫기</a:t>
+            </a:r>
+            <a:r>
+              <a:rPr lang="en-US" altLang="ko-KR" dirty="0" smtClean="0"/>
+              <a:t>’</a:t>
+            </a:r>
+            <a:r>
+              <a:rPr lang="ko-KR" altLang="en-US" dirty="0" smtClean="0"/>
+              <a:t>를</a:t>
+            </a:r>
+            <a:r>
+              <a:rPr lang="en-US" altLang="ko-KR" dirty="0"/>
+              <a:t> </a:t>
+            </a:r>
+            <a:r>
+              <a:rPr lang="ko-KR" altLang="en-US" dirty="0" smtClean="0"/>
+              <a:t>하여 </a:t>
+            </a:r>
+            <a:r>
+              <a:rPr lang="en-US" altLang="ko-KR" dirty="0" smtClean="0"/>
+              <a:t>merge</a:t>
+            </a:r>
+            <a:r>
+              <a:rPr lang="ko-KR" altLang="en-US" dirty="0" smtClean="0"/>
+              <a:t>를 완료하면 </a:t>
+            </a:r>
+            <a:r>
+              <a:rPr lang="en-US" altLang="ko-KR" dirty="0" smtClean="0"/>
+              <a:t>commit</a:t>
+            </a:r>
+            <a:r>
+              <a:rPr lang="ko-KR" altLang="en-US" dirty="0"/>
+              <a:t> </a:t>
+            </a:r>
+            <a:r>
+              <a:rPr lang="ko-KR" altLang="en-US" dirty="0" smtClean="0"/>
+              <a:t>준비가 됨</a:t>
+            </a:r>
+            <a:r>
+              <a:rPr lang="en-US" altLang="ko-KR" dirty="0" smtClean="0"/>
+              <a:t>.</a:t>
+            </a:r>
+            <a:endParaRPr lang="en-US" altLang="ko-KR" dirty="0" smtClean="0"/>
+          </a:p>
+        </p:txBody>
+      </p:sp>
+      <p:sp>
+        <p:nvSpPr>
+          <p:cNvPr id="3" name="텍스트 개체 틀 2"/>
+          <p:cNvSpPr>
+            <a:spLocks noGrp="1"/>
+          </p:cNvSpPr>
+          <p:nvPr>
+            <p:ph type="body" sz="quarter" idx="12"/>
+          </p:nvPr>
+        </p:nvSpPr>
+        <p:spPr/>
+        <p:txBody>
+          <a:bodyPr/>
+          <a:lstStyle/>
+          <a:p>
+            <a:r>
+              <a:rPr lang="en-US" altLang="ko-KR" dirty="0" smtClean="0"/>
+              <a:t>6. </a:t>
+            </a:r>
+            <a:r>
+              <a:rPr lang="en-US" altLang="ko-KR" dirty="0" smtClean="0"/>
+              <a:t>Merge(V</a:t>
+            </a:r>
+            <a:r>
+              <a:rPr lang="en-US" altLang="ko-KR" dirty="0" smtClean="0"/>
+              <a:t>)</a:t>
             </a:r>
             <a:endParaRPr lang="ko-KR" altLang="en-US" dirty="0"/>
           </a:p>
@@ -11181,7 +11644,7 @@
         </p:nvGrpSpPr>
         <p:grpSpPr>
           <a:xfrm>
-            <a:off x="1134624" y="6165303"/>
+            <a:off x="1979712" y="6192465"/>
             <a:ext cx="2141232" cy="146947"/>
             <a:chOff x="918600" y="6165303"/>
             <a:chExt cx="2141232" cy="146947"/>
@@ -11312,7 +11775,7 @@
 </p:sld>
 </file>
 
-<file path=ppt/slides/slide17.xml><?xml version="1.0" encoding="utf-8"?>
+<file path=ppt/slides/slide18.xml><?xml version="1.0" encoding="utf-8"?>
 <p:sld xmlns:a="http://schemas.openxmlformats.org/drawingml/2006/main" xmlns:r="http://schemas.openxmlformats.org/officeDocument/2006/relationships" xmlns:p="http://schemas.openxmlformats.org/presentationml/2006/main">
   <p:cSld>
     <p:spTree>
@@ -11349,6 +11812,159 @@
             </a:pPr>
             <a:r>
               <a:rPr lang="en-US" altLang="ko-KR" dirty="0" smtClean="0"/>
+              <a:t>Merge </a:t>
+            </a:r>
+            <a:r>
+              <a:rPr lang="ko-KR" altLang="en-US" dirty="0" smtClean="0"/>
+              <a:t>결과</a:t>
+            </a:r>
+            <a:endParaRPr lang="en-US" altLang="ko-KR" dirty="0" smtClean="0"/>
+          </a:p>
+        </p:txBody>
+      </p:sp>
+      <p:sp>
+        <p:nvSpPr>
+          <p:cNvPr id="3" name="텍스트 개체 틀 2"/>
+          <p:cNvSpPr>
+            <a:spLocks noGrp="1"/>
+          </p:cNvSpPr>
+          <p:nvPr>
+            <p:ph type="body" sz="quarter" idx="12"/>
+          </p:nvPr>
+        </p:nvSpPr>
+        <p:spPr/>
+        <p:txBody>
+          <a:bodyPr/>
+          <a:lstStyle/>
+          <a:p>
+            <a:r>
+              <a:rPr lang="en-US" altLang="ko-KR" dirty="0" smtClean="0"/>
+              <a:t>6. </a:t>
+            </a:r>
+            <a:r>
+              <a:rPr lang="en-US" altLang="ko-KR" dirty="0" smtClean="0"/>
+              <a:t>Merge(VI)</a:t>
+            </a:r>
+            <a:endParaRPr lang="ko-KR" altLang="en-US" dirty="0"/>
+          </a:p>
+        </p:txBody>
+      </p:sp>
+      <p:pic>
+        <p:nvPicPr>
+          <p:cNvPr id="3074" name="Picture 2"/>
+          <p:cNvPicPr>
+            <a:picLocks noChangeAspect="1" noChangeArrowheads="1"/>
+          </p:cNvPicPr>
+          <p:nvPr/>
+        </p:nvPicPr>
+        <p:blipFill>
+          <a:blip r:embed="rId2">
+            <a:extLst>
+              <a:ext uri="{28A0092B-C50C-407E-A947-70E740481C1C}">
+                <a14:useLocalDpi xmlns:a14="http://schemas.microsoft.com/office/drawing/2010/main" val="0"/>
+              </a:ext>
+            </a:extLst>
+          </a:blip>
+          <a:srcRect/>
+          <a:stretch>
+            <a:fillRect/>
+          </a:stretch>
+        </p:blipFill>
+        <p:spPr bwMode="auto">
+          <a:xfrm>
+            <a:off x="7140" y="1340768"/>
+            <a:ext cx="9144000" cy="4301361"/>
+          </a:xfrm>
+          <a:prstGeom prst="rect">
+            <a:avLst/>
+          </a:prstGeom>
+          <a:noFill/>
+          <a:ln>
+            <a:noFill/>
+          </a:ln>
+          <a:extLst>
+            <a:ext uri="{909E8E84-426E-40DD-AFC4-6F175D3DCCD1}">
+              <a14:hiddenFill xmlns:a14="http://schemas.microsoft.com/office/drawing/2010/main">
+                <a:solidFill>
+                  <a:schemeClr val="accent1"/>
+                </a:solidFill>
+              </a14:hiddenFill>
+            </a:ext>
+            <a:ext uri="{91240B29-F687-4F45-9708-019B960494DF}">
+              <a14:hiddenLine xmlns:a14="http://schemas.microsoft.com/office/drawing/2010/main" w="9525">
+                <a:solidFill>
+                  <a:schemeClr val="tx1"/>
+                </a:solidFill>
+                <a:miter lim="800000"/>
+                <a:headEnd/>
+                <a:tailEnd/>
+              </a14:hiddenLine>
+            </a:ext>
+          </a:extLst>
+        </p:spPr>
+      </p:pic>
+    </p:spTree>
+    <p:extLst>
+      <p:ext uri="{BB962C8B-B14F-4D97-AF65-F5344CB8AC3E}">
+        <p14:creationId xmlns:p14="http://schemas.microsoft.com/office/powerpoint/2010/main" val="1855663036"/>
+      </p:ext>
+    </p:extLst>
+  </p:cSld>
+  <p:clrMapOvr>
+    <a:masterClrMapping/>
+  </p:clrMapOvr>
+  <mc:AlternateContent xmlns:mc="http://schemas.openxmlformats.org/markup-compatibility/2006" xmlns:p14="http://schemas.microsoft.com/office/powerpoint/2010/main">
+    <mc:Choice Requires="p14">
+      <p:transition p14:dur="300">
+        <p:fade/>
+      </p:transition>
+    </mc:Choice>
+    <mc:Fallback xmlns="">
+      <p:transition>
+        <p:fade/>
+      </p:transition>
+    </mc:Fallback>
+  </mc:AlternateContent>
+</p:sld>
+</file>
+
+<file path=ppt/slides/slide19.xml><?xml version="1.0" encoding="utf-8"?>
+<p:sld xmlns:a="http://schemas.openxmlformats.org/drawingml/2006/main" xmlns:r="http://schemas.openxmlformats.org/officeDocument/2006/relationships" xmlns:p="http://schemas.openxmlformats.org/presentationml/2006/main">
+  <p:cSld>
+    <p:spTree>
+      <p:nvGrpSpPr>
+        <p:cNvPr id="1" name=""/>
+        <p:cNvGrpSpPr/>
+        <p:nvPr/>
+      </p:nvGrpSpPr>
+      <p:grpSpPr>
+        <a:xfrm>
+          <a:off x="0" y="0"/>
+          <a:ext cx="0" cy="0"/>
+          <a:chOff x="0" y="0"/>
+          <a:chExt cx="0" cy="0"/>
+        </a:xfrm>
+      </p:grpSpPr>
+      <p:sp>
+        <p:nvSpPr>
+          <p:cNvPr id="2" name="내용 개체 틀 1"/>
+          <p:cNvSpPr>
+            <a:spLocks noGrp="1"/>
+          </p:cNvSpPr>
+          <p:nvPr>
+            <p:ph sz="half" idx="10"/>
+          </p:nvPr>
+        </p:nvSpPr>
+        <p:spPr/>
+        <p:txBody>
+          <a:bodyPr/>
+          <a:lstStyle/>
+          <a:p>
+            <a:pPr>
+              <a:buSzPct val="100000"/>
+            </a:pPr>
+            <a:r>
+              <a:rPr lang="en-US" altLang="ko-KR" dirty="0" smtClean="0"/>
               <a:t>Stash</a:t>
             </a:r>
           </a:p>
@@ -11494,9 +12110,12 @@
             </a:r>
             <a:r>
               <a:rPr lang="ko-KR" altLang="en-US" dirty="0" smtClean="0"/>
-              <a:t>파일들은 변경되기 전으로 복원 됨</a:t>
-            </a:r>
-            <a:endParaRPr lang="en-US" altLang="ko-KR" dirty="0" smtClean="0"/>
+              <a:t>파일들은 변경되기 전으로 복원된다</a:t>
+            </a:r>
+            <a:r>
+              <a:rPr lang="en-US" altLang="ko-KR" dirty="0" smtClean="0"/>
+              <a:t>.</a:t>
+            </a:r>
           </a:p>
           <a:p>
             <a:pPr lvl="1">
@@ -11520,9 +12139,12 @@
             </a:r>
             <a:r>
               <a:rPr lang="ko-KR" altLang="en-US" dirty="0" smtClean="0"/>
-              <a:t>파일과 비교를 할 수도 있음</a:t>
-            </a:r>
-            <a:endParaRPr lang="en-US" altLang="ko-KR" dirty="0" smtClean="0"/>
+              <a:t>파일과 비교를 할 수도 있다</a:t>
+            </a:r>
+            <a:r>
+              <a:rPr lang="en-US" altLang="ko-KR" dirty="0" smtClean="0"/>
+              <a:t>.</a:t>
+            </a:r>
           </a:p>
           <a:p>
             <a:pPr lvl="1">
@@ -11766,7 +12388,196 @@
 </p:sld>
 </file>
 
-<file path=ppt/slides/slide18.xml><?xml version="1.0" encoding="utf-8"?>
+<file path=ppt/slides/slide2.xml><?xml version="1.0" encoding="utf-8"?>
+<p:sld xmlns:a="http://schemas.openxmlformats.org/drawingml/2006/main" xmlns:r="http://schemas.openxmlformats.org/officeDocument/2006/relationships" xmlns:p="http://schemas.openxmlformats.org/presentationml/2006/main">
+  <p:cSld>
+    <p:spTree>
+      <p:nvGrpSpPr>
+        <p:cNvPr id="1" name=""/>
+        <p:cNvGrpSpPr/>
+        <p:nvPr/>
+      </p:nvGrpSpPr>
+      <p:grpSpPr>
+        <a:xfrm>
+          <a:off x="0" y="0"/>
+          <a:ext cx="0" cy="0"/>
+          <a:chOff x="0" y="0"/>
+          <a:chExt cx="0" cy="0"/>
+        </a:xfrm>
+      </p:grpSpPr>
+      <p:sp>
+        <p:nvSpPr>
+          <p:cNvPr id="3" name="내용 개체 틀 2"/>
+          <p:cNvSpPr>
+            <a:spLocks noGrp="1"/>
+          </p:cNvSpPr>
+          <p:nvPr>
+            <p:ph sz="half" idx="10"/>
+          </p:nvPr>
+        </p:nvSpPr>
+        <p:spPr/>
+        <p:txBody>
+          <a:bodyPr/>
+          <a:lstStyle/>
+          <a:p>
+            <a:pPr>
+              <a:buSzPct val="100000"/>
+            </a:pPr>
+            <a:r>
+              <a:rPr lang="en-US" altLang="ko-KR" dirty="0"/>
+              <a:t>Project </a:t>
+            </a:r>
+            <a:r>
+              <a:rPr lang="ko-KR" altLang="en-US" dirty="0"/>
+              <a:t>생성 및 원격저장소 </a:t>
+            </a:r>
+            <a:r>
+              <a:rPr lang="ko-KR" altLang="en-US" dirty="0" smtClean="0"/>
+              <a:t>연결</a:t>
+            </a:r>
+            <a:endParaRPr lang="en-US" altLang="ko-KR" dirty="0" smtClean="0"/>
+          </a:p>
+          <a:p>
+            <a:pPr>
+              <a:buSzPct val="100000"/>
+            </a:pPr>
+            <a:r>
+              <a:rPr lang="ko-KR" altLang="en-US" dirty="0" smtClean="0"/>
+              <a:t>파일상태</a:t>
+            </a:r>
+            <a:endParaRPr lang="en-US" altLang="ko-KR" dirty="0" smtClean="0"/>
+          </a:p>
+          <a:p>
+            <a:pPr>
+              <a:buSzPct val="100000"/>
+            </a:pPr>
+            <a:r>
+              <a:rPr lang="en-US" altLang="ko-KR" dirty="0" smtClean="0"/>
+              <a:t>Branch</a:t>
+            </a:r>
+          </a:p>
+          <a:p>
+            <a:pPr>
+              <a:buSzPct val="100000"/>
+            </a:pPr>
+            <a:r>
+              <a:rPr lang="ko-KR" altLang="en-US" dirty="0" smtClean="0"/>
+              <a:t>비교</a:t>
+            </a:r>
+            <a:endParaRPr lang="en-US" altLang="ko-KR" dirty="0" smtClean="0"/>
+          </a:p>
+          <a:p>
+            <a:pPr>
+              <a:buSzPct val="100000"/>
+            </a:pPr>
+            <a:r>
+              <a:rPr lang="en-US" altLang="ko-KR" dirty="0" smtClean="0"/>
+              <a:t>Revert</a:t>
+            </a:r>
+          </a:p>
+          <a:p>
+            <a:pPr>
+              <a:buSzPct val="100000"/>
+            </a:pPr>
+            <a:r>
+              <a:rPr lang="en-US" altLang="ko-KR" dirty="0" smtClean="0"/>
+              <a:t>Merge</a:t>
+            </a:r>
+          </a:p>
+          <a:p>
+            <a:pPr>
+              <a:buSzPct val="100000"/>
+            </a:pPr>
+            <a:r>
+              <a:rPr lang="en-US" altLang="ko-KR" dirty="0" smtClean="0"/>
+              <a:t>Stash</a:t>
+            </a:r>
+          </a:p>
+          <a:p>
+            <a:pPr>
+              <a:buSzPct val="100000"/>
+            </a:pPr>
+            <a:r>
+              <a:rPr lang="en-US" altLang="ko-KR" dirty="0" smtClean="0"/>
+              <a:t>Fetch, Push, </a:t>
+            </a:r>
+            <a:r>
+              <a:rPr lang="en-US" altLang="ko-KR" dirty="0" smtClean="0"/>
+              <a:t>Pull</a:t>
+            </a:r>
+          </a:p>
+          <a:p>
+            <a:pPr>
+              <a:buSzPct val="100000"/>
+            </a:pPr>
+            <a:r>
+              <a:rPr lang="en-US" altLang="ko-KR" dirty="0" smtClean="0"/>
+              <a:t>Tag </a:t>
+            </a:r>
+            <a:r>
+              <a:rPr lang="ko-KR" altLang="en-US" dirty="0" smtClean="0"/>
+              <a:t>유의사항</a:t>
+            </a:r>
+            <a:endParaRPr lang="ko-KR" altLang="en-US" dirty="0"/>
+          </a:p>
+        </p:txBody>
+      </p:sp>
+      <p:sp>
+        <p:nvSpPr>
+          <p:cNvPr id="4" name="텍스트 개체 틀 3"/>
+          <p:cNvSpPr>
+            <a:spLocks noGrp="1"/>
+          </p:cNvSpPr>
+          <p:nvPr>
+            <p:ph type="body" sz="quarter" idx="12"/>
+          </p:nvPr>
+        </p:nvSpPr>
+        <p:spPr/>
+        <p:txBody>
+          <a:bodyPr/>
+          <a:lstStyle/>
+          <a:p>
+            <a:r>
+              <a:rPr lang="en-US" altLang="ko-KR" dirty="0" smtClean="0"/>
+              <a:t>Contents</a:t>
+            </a:r>
+            <a:endParaRPr lang="ko-KR" altLang="en-US" dirty="0"/>
+          </a:p>
+        </p:txBody>
+      </p:sp>
+    </p:spTree>
+    <p:extLst>
+      <p:ext uri="{BB962C8B-B14F-4D97-AF65-F5344CB8AC3E}">
+        <p14:creationId xmlns:p14="http://schemas.microsoft.com/office/powerpoint/2010/main" val="3462241943"/>
+      </p:ext>
+    </p:extLst>
+  </p:cSld>
+  <p:clrMapOvr>
+    <a:masterClrMapping/>
+  </p:clrMapOvr>
+  <mc:AlternateContent xmlns:mc="http://schemas.openxmlformats.org/markup-compatibility/2006" xmlns:p14="http://schemas.microsoft.com/office/powerpoint/2010/main">
+    <mc:Choice Requires="p14">
+      <p:transition p14:dur="300">
+        <p:fade/>
+      </p:transition>
+    </mc:Choice>
+    <mc:Fallback xmlns="">
+      <p:transition>
+        <p:fade/>
+      </p:transition>
+    </mc:Fallback>
+  </mc:AlternateContent>
+  <p:timing>
+    <p:tnLst>
+      <p:par>
+        <p:cTn id="1" dur="indefinite" restart="never" nodeType="tmRoot"/>
+      </p:par>
+    </p:tnLst>
+  </p:timing>
+</p:sld>
+</file>
+
+<file path=ppt/slides/slide20.xml><?xml version="1.0" encoding="utf-8"?>
 <p:sld xmlns:a="http://schemas.openxmlformats.org/drawingml/2006/main" xmlns:r="http://schemas.openxmlformats.org/officeDocument/2006/relationships" xmlns:p="http://schemas.openxmlformats.org/presentationml/2006/main">
   <p:cSld>
     <p:spTree>
@@ -11798,13 +12609,11 @@
           <a:bodyPr/>
           <a:lstStyle/>
           <a:p>
-            <a:pPr>
-              <a:buSzPct val="100000"/>
-            </a:pPr>
-            <a:r>
-              <a:rPr lang="en-US" altLang="ko-KR" dirty="0" smtClean="0"/>
-              <a:t>Stash</a:t>
-            </a:r>
+            <a:pPr marL="0" indent="0">
+              <a:buSzPct val="100000"/>
+              <a:buNone/>
+            </a:pPr>
+            <a:endParaRPr lang="en-US" altLang="ko-KR" dirty="0" smtClean="0"/>
           </a:p>
           <a:p>
             <a:pPr>
@@ -12114,7 +12923,7 @@
 </p:sld>
 </file>
 
-<file path=ppt/slides/slide19.xml><?xml version="1.0" encoding="utf-8"?>
+<file path=ppt/slides/slide21.xml><?xml version="1.0" encoding="utf-8"?>
 <p:sld xmlns:a="http://schemas.openxmlformats.org/drawingml/2006/main" xmlns:r="http://schemas.openxmlformats.org/officeDocument/2006/relationships" xmlns:p="http://schemas.openxmlformats.org/presentationml/2006/main">
   <p:cSld>
     <p:spTree>
@@ -12160,11 +12969,7 @@
             </a:pPr>
             <a:r>
               <a:rPr lang="ko-KR" altLang="en-US" dirty="0" smtClean="0"/>
-              <a:t>연결된 원격 저장소에서 </a:t>
-            </a:r>
-            <a:r>
-              <a:rPr lang="ko-KR" altLang="en-US" dirty="0" smtClean="0"/>
-              <a:t>파일들을 불러</a:t>
+              <a:t>연결된 원격 저장소에서 파일들을 불러</a:t>
             </a:r>
             <a:r>
               <a:rPr lang="ko-KR" altLang="en-US" dirty="0"/>
@@ -12182,11 +12987,7 @@
             </a:r>
             <a:r>
               <a:rPr lang="ko-KR" altLang="en-US" dirty="0" smtClean="0"/>
-              <a:t>가 가리키는 </a:t>
-            </a:r>
-            <a:r>
-              <a:rPr lang="ko-KR" altLang="en-US" dirty="0" smtClean="0"/>
-              <a:t>곳은 변경되지 않고</a:t>
+              <a:t>가 가리키는 곳은 변경되지 않고</a:t>
             </a:r>
             <a:r>
               <a:rPr lang="en-US" altLang="ko-KR" dirty="0" smtClean="0"/>
@@ -12313,7 +13114,6 @@
               <a:rPr lang="en-US" altLang="ko-KR" dirty="0" smtClean="0"/>
               <a:t>Pull = Fetch + Merge</a:t>
             </a:r>
-            <a:endParaRPr lang="en-US" altLang="ko-KR" dirty="0" smtClean="0"/>
           </a:p>
           <a:p>
             <a:pPr lvl="1">
@@ -12649,7 +13449,7 @@
 </p:sld>
 </file>
 
-<file path=ppt/slides/slide2.xml><?xml version="1.0" encoding="utf-8"?>
+<file path=ppt/slides/slide22.xml><?xml version="1.0" encoding="utf-8"?>
 <p:sld xmlns:a="http://schemas.openxmlformats.org/drawingml/2006/main" xmlns:r="http://schemas.openxmlformats.org/officeDocument/2006/relationships" xmlns:p="http://schemas.openxmlformats.org/presentationml/2006/main">
   <p:cSld>
     <p:spTree>
@@ -12668,7 +13468,7 @@
       </p:grpSpPr>
       <p:sp>
         <p:nvSpPr>
-          <p:cNvPr id="3" name="내용 개체 틀 2"/>
+          <p:cNvPr id="2" name="내용 개체 틀 1"/>
           <p:cNvSpPr>
             <a:spLocks noGrp="1"/>
           </p:cNvSpPr>
@@ -12685,91 +13485,408 @@
               <a:buSzPct val="100000"/>
             </a:pPr>
             <a:r>
-              <a:rPr lang="en-US" altLang="ko-KR" dirty="0"/>
-              <a:t>Project </a:t>
-            </a:r>
-            <a:r>
-              <a:rPr lang="ko-KR" altLang="en-US" dirty="0"/>
-              <a:t>생성 및 원격저장소 </a:t>
-            </a:r>
-            <a:r>
-              <a:rPr lang="ko-KR" altLang="en-US" dirty="0" smtClean="0"/>
-              <a:t>연결</a:t>
+              <a:rPr lang="en-US" altLang="ko-KR" dirty="0" smtClean="0"/>
+              <a:t>Tag</a:t>
+            </a:r>
+          </a:p>
+          <a:p>
+            <a:pPr lvl="1">
+              <a:buSzPct val="100000"/>
+            </a:pPr>
+            <a:r>
+              <a:rPr lang="en-US" altLang="ko-KR" dirty="0" smtClean="0"/>
+              <a:t>Simulink</a:t>
+            </a:r>
+            <a:r>
+              <a:rPr lang="ko-KR" altLang="en-US" dirty="0" smtClean="0"/>
+              <a:t>에서 생성한 </a:t>
+            </a:r>
+            <a:r>
+              <a:rPr lang="en-US" altLang="ko-KR" dirty="0" smtClean="0"/>
+              <a:t>tag</a:t>
+            </a:r>
+            <a:r>
+              <a:rPr lang="ko-KR" altLang="en-US" dirty="0" smtClean="0"/>
+              <a:t>는 </a:t>
+            </a:r>
+            <a:r>
+              <a:rPr lang="en-US" altLang="ko-KR" dirty="0" smtClean="0"/>
+              <a:t>commit</a:t>
+            </a:r>
+            <a:r>
+              <a:rPr lang="ko-KR" altLang="en-US" dirty="0" smtClean="0"/>
+              <a:t>하여도 원격저장소에 저장되지 않는다</a:t>
+            </a:r>
+            <a:r>
+              <a:rPr lang="en-US" altLang="ko-KR" dirty="0" smtClean="0"/>
+              <a:t>.</a:t>
+            </a:r>
+          </a:p>
+          <a:p>
+            <a:pPr lvl="1">
+              <a:buSzPct val="100000"/>
+            </a:pPr>
+            <a:r>
+              <a:rPr lang="en-US" altLang="ko-KR" dirty="0" smtClean="0"/>
+              <a:t>Simulink</a:t>
+            </a:r>
+            <a:r>
+              <a:rPr lang="ko-KR" altLang="en-US" dirty="0" smtClean="0"/>
+              <a:t>에서 </a:t>
+            </a:r>
+            <a:r>
+              <a:rPr lang="en-US" altLang="ko-KR" dirty="0" smtClean="0"/>
+              <a:t>tag</a:t>
+            </a:r>
+            <a:r>
+              <a:rPr lang="ko-KR" altLang="en-US" dirty="0" smtClean="0"/>
+              <a:t>를 삭제할 수 없다</a:t>
+            </a:r>
+            <a:r>
+              <a:rPr lang="en-US" altLang="ko-KR" dirty="0" smtClean="0"/>
+              <a:t>.</a:t>
             </a:r>
             <a:endParaRPr lang="en-US" altLang="ko-KR" dirty="0" smtClean="0"/>
           </a:p>
           <a:p>
-            <a:pPr>
-              <a:buSzPct val="100000"/>
-            </a:pPr>
-            <a:r>
-              <a:rPr lang="ko-KR" altLang="en-US" dirty="0" smtClean="0"/>
-              <a:t>파일상태</a:t>
-            </a:r>
+            <a:pPr lvl="1">
+              <a:buSzPct val="100000"/>
+            </a:pPr>
+            <a:r>
+              <a:rPr lang="ko-KR" altLang="en-US" dirty="0" smtClean="0"/>
+              <a:t> </a:t>
+            </a:r>
+            <a:r>
+              <a:rPr lang="en-US" altLang="ko-KR" dirty="0" err="1" smtClean="0"/>
+              <a:t>git</a:t>
+            </a:r>
+            <a:r>
+              <a:rPr lang="en-US" altLang="ko-KR" dirty="0" smtClean="0"/>
+              <a:t> bash</a:t>
+            </a:r>
+            <a:r>
+              <a:rPr lang="ko-KR" altLang="en-US" dirty="0" smtClean="0"/>
+              <a:t>에서 </a:t>
+            </a:r>
+            <a:r>
+              <a:rPr lang="en-US" altLang="ko-KR" dirty="0" smtClean="0"/>
+              <a:t>‘list’</a:t>
+            </a:r>
+            <a:r>
+              <a:rPr lang="ko-KR" altLang="en-US" dirty="0" smtClean="0"/>
+              <a:t>라는 </a:t>
+            </a:r>
+            <a:r>
+              <a:rPr lang="en-US" altLang="ko-KR" dirty="0" smtClean="0"/>
+              <a:t>tag</a:t>
+            </a:r>
+            <a:r>
+              <a:rPr lang="ko-KR" altLang="en-US" dirty="0" smtClean="0"/>
+              <a:t>를 생성하고 해당 </a:t>
+            </a:r>
+            <a:r>
+              <a:rPr lang="en-US" altLang="ko-KR" dirty="0" smtClean="0"/>
+              <a:t>commit</a:t>
+            </a:r>
+            <a:r>
+              <a:rPr lang="ko-KR" altLang="en-US" dirty="0" smtClean="0"/>
+              <a:t>을 </a:t>
+            </a:r>
+            <a:r>
+              <a:rPr lang="en-US" altLang="ko-KR" dirty="0" smtClean="0"/>
+              <a:t>Simulink</a:t>
+            </a:r>
+            <a:r>
+              <a:rPr lang="ko-KR" altLang="en-US" dirty="0" smtClean="0"/>
+              <a:t>에서 </a:t>
+            </a:r>
+            <a:r>
+              <a:rPr lang="en-US" altLang="ko-KR" dirty="0" smtClean="0"/>
+              <a:t>pull</a:t>
+            </a:r>
+            <a:r>
+              <a:rPr lang="ko-KR" altLang="en-US" dirty="0" smtClean="0"/>
+              <a:t>을 하여 불러온 후</a:t>
+            </a:r>
+            <a:r>
+              <a:rPr lang="en-US" altLang="ko-KR" dirty="0" smtClean="0"/>
+              <a:t>, ‘another’</a:t>
+            </a:r>
+            <a:r>
+              <a:rPr lang="ko-KR" altLang="en-US" dirty="0" smtClean="0"/>
+              <a:t>라는 </a:t>
+            </a:r>
+            <a:r>
+              <a:rPr lang="en-US" altLang="ko-KR" dirty="0" smtClean="0"/>
+              <a:t>tag</a:t>
+            </a:r>
+            <a:r>
+              <a:rPr lang="ko-KR" altLang="en-US" dirty="0" smtClean="0"/>
+              <a:t>를 생성하였을 때 위와 같이 서로 다른 </a:t>
+            </a:r>
+            <a:r>
+              <a:rPr lang="en-US" altLang="ko-KR" dirty="0" smtClean="0"/>
+              <a:t>tag</a:t>
+            </a:r>
+            <a:r>
+              <a:rPr lang="ko-KR" altLang="en-US" dirty="0" smtClean="0"/>
+              <a:t>가 존재하게 된다</a:t>
+            </a:r>
+            <a:r>
+              <a:rPr lang="en-US" altLang="ko-KR" dirty="0" smtClean="0"/>
+              <a:t>.</a:t>
+            </a:r>
+            <a:endParaRPr lang="en-US" altLang="ko-KR" dirty="0"/>
+          </a:p>
+          <a:p>
+            <a:pPr lvl="1">
+              <a:buSzPct val="100000"/>
+            </a:pPr>
+            <a:r>
+              <a:rPr lang="ko-KR" altLang="en-US" dirty="0" smtClean="0"/>
+              <a:t>원격 저장소로부터 </a:t>
+            </a:r>
+            <a:r>
+              <a:rPr lang="en-US" altLang="ko-KR" dirty="0" smtClean="0"/>
+              <a:t>tag</a:t>
+            </a:r>
+            <a:r>
+              <a:rPr lang="ko-KR" altLang="en-US" dirty="0" smtClean="0"/>
+              <a:t>를 </a:t>
+            </a:r>
+            <a:r>
+              <a:rPr lang="en-US" altLang="ko-KR" dirty="0" smtClean="0"/>
+              <a:t>pull</a:t>
+            </a:r>
+            <a:r>
+              <a:rPr lang="ko-KR" altLang="en-US" dirty="0" smtClean="0"/>
+              <a:t>한 상태에서 </a:t>
+            </a:r>
+            <a:r>
+              <a:rPr lang="en-US" altLang="ko-KR" dirty="0" err="1" smtClean="0"/>
+              <a:t>git</a:t>
+            </a:r>
+            <a:r>
+              <a:rPr lang="en-US" altLang="ko-KR" dirty="0" smtClean="0"/>
+              <a:t> bash</a:t>
+            </a:r>
+            <a:r>
+              <a:rPr lang="ko-KR" altLang="en-US" dirty="0" smtClean="0"/>
+              <a:t>를 통해 해당 </a:t>
+            </a:r>
+            <a:r>
+              <a:rPr lang="en-US" altLang="ko-KR" dirty="0" smtClean="0"/>
+              <a:t>tag</a:t>
+            </a:r>
+            <a:r>
+              <a:rPr lang="ko-KR" altLang="en-US" dirty="0" smtClean="0"/>
+              <a:t>를 원격저장소에서 삭제하여도 </a:t>
+            </a:r>
+            <a:r>
+              <a:rPr lang="en-US" altLang="ko-KR" dirty="0" err="1" smtClean="0"/>
+              <a:t>simulink</a:t>
+            </a:r>
+            <a:r>
+              <a:rPr lang="ko-KR" altLang="en-US" dirty="0" smtClean="0"/>
+              <a:t>에서 삭제된 사실이 반영되지 않는다</a:t>
+            </a:r>
+            <a:r>
+              <a:rPr lang="en-US" altLang="ko-KR" dirty="0" smtClean="0"/>
+              <a:t>. </a:t>
+            </a:r>
+            <a:r>
+              <a:rPr lang="ko-KR" altLang="en-US" dirty="0" smtClean="0"/>
+              <a:t>위의 예를 들었을 때</a:t>
+            </a:r>
+            <a:r>
+              <a:rPr lang="en-US" altLang="ko-KR" dirty="0" smtClean="0"/>
+              <a:t>, ‘list’ tag</a:t>
+            </a:r>
+            <a:r>
+              <a:rPr lang="ko-KR" altLang="en-US" dirty="0" smtClean="0"/>
+              <a:t>를 </a:t>
+            </a:r>
+            <a:r>
+              <a:rPr lang="en-US" altLang="ko-KR" dirty="0" err="1" smtClean="0"/>
+              <a:t>git</a:t>
+            </a:r>
+            <a:r>
+              <a:rPr lang="en-US" altLang="ko-KR" dirty="0" smtClean="0"/>
+              <a:t> bash</a:t>
+            </a:r>
+            <a:r>
+              <a:rPr lang="ko-KR" altLang="en-US" dirty="0" smtClean="0"/>
+              <a:t>를 통해 원격저장소로부터 삭제를 한 후</a:t>
+            </a:r>
+            <a:r>
+              <a:rPr lang="en-US" altLang="ko-KR" dirty="0" smtClean="0"/>
+              <a:t>, </a:t>
+            </a:r>
+            <a:r>
+              <a:rPr lang="en-US" altLang="ko-KR" dirty="0" err="1" smtClean="0"/>
+              <a:t>simulink</a:t>
+            </a:r>
+            <a:r>
+              <a:rPr lang="ko-KR" altLang="en-US" dirty="0" smtClean="0"/>
+              <a:t>에서 </a:t>
+            </a:r>
+            <a:r>
+              <a:rPr lang="en-US" altLang="ko-KR" dirty="0" smtClean="0"/>
+              <a:t>pull</a:t>
+            </a:r>
+            <a:r>
+              <a:rPr lang="ko-KR" altLang="en-US" dirty="0" smtClean="0"/>
+              <a:t>을 하여도 </a:t>
+            </a:r>
+            <a:r>
+              <a:rPr lang="en-US" altLang="ko-KR" dirty="0" err="1" smtClean="0"/>
+              <a:t>simulink</a:t>
+            </a:r>
+            <a:r>
+              <a:rPr lang="ko-KR" altLang="en-US" dirty="0" smtClean="0"/>
+              <a:t>의 </a:t>
+            </a:r>
+            <a:r>
+              <a:rPr lang="en-US" altLang="ko-KR" dirty="0" smtClean="0"/>
+              <a:t>branch</a:t>
+            </a:r>
+            <a:r>
+              <a:rPr lang="ko-KR" altLang="en-US" dirty="0" smtClean="0"/>
+              <a:t>에서 </a:t>
+            </a:r>
+            <a:r>
+              <a:rPr lang="en-US" altLang="ko-KR" dirty="0" smtClean="0"/>
+              <a:t>‘list’</a:t>
+            </a:r>
+            <a:r>
+              <a:rPr lang="ko-KR" altLang="en-US" dirty="0" smtClean="0"/>
+              <a:t>라는 </a:t>
+            </a:r>
+            <a:r>
+              <a:rPr lang="en-US" altLang="ko-KR" dirty="0" smtClean="0"/>
+              <a:t>tag</a:t>
+            </a:r>
+            <a:r>
+              <a:rPr lang="ko-KR" altLang="en-US" dirty="0" smtClean="0"/>
+              <a:t>는 삭제되지 않는다</a:t>
+            </a:r>
+            <a:r>
+              <a:rPr lang="en-US" altLang="ko-KR" dirty="0" smtClean="0"/>
+              <a:t>.</a:t>
+            </a:r>
+          </a:p>
+          <a:p>
+            <a:pPr lvl="1">
+              <a:buSzPct val="100000"/>
+            </a:pPr>
             <a:endParaRPr lang="en-US" altLang="ko-KR" dirty="0" smtClean="0"/>
           </a:p>
           <a:p>
-            <a:pPr>
-              <a:buSzPct val="100000"/>
-            </a:pPr>
-            <a:r>
-              <a:rPr lang="en-US" altLang="ko-KR" dirty="0" smtClean="0"/>
-              <a:t>Branch</a:t>
-            </a:r>
-          </a:p>
-          <a:p>
-            <a:pPr>
-              <a:buSzPct val="100000"/>
-            </a:pPr>
-            <a:r>
-              <a:rPr lang="ko-KR" altLang="en-US" dirty="0" smtClean="0"/>
-              <a:t>비교</a:t>
-            </a:r>
+            <a:pPr marL="0" indent="0">
+              <a:buSzPct val="100000"/>
+              <a:buNone/>
+            </a:pPr>
             <a:endParaRPr lang="en-US" altLang="ko-KR" dirty="0" smtClean="0"/>
           </a:p>
           <a:p>
-            <a:pPr>
-              <a:buSzPct val="100000"/>
-            </a:pPr>
-            <a:r>
-              <a:rPr lang="en-US" altLang="ko-KR" dirty="0" smtClean="0"/>
-              <a:t>Revert</a:t>
-            </a:r>
+            <a:pPr lvl="1">
+              <a:buSzPct val="100000"/>
+            </a:pPr>
+            <a:r>
+              <a:rPr lang="ko-KR" altLang="en-US" dirty="0" smtClean="0"/>
+              <a:t>결론적으로</a:t>
+            </a:r>
+            <a:r>
+              <a:rPr lang="en-US" altLang="ko-KR" dirty="0" smtClean="0"/>
+              <a:t>, Simulink</a:t>
+            </a:r>
+            <a:r>
+              <a:rPr lang="ko-KR" altLang="en-US" dirty="0" smtClean="0"/>
+              <a:t>에서 </a:t>
+            </a:r>
+            <a:r>
+              <a:rPr lang="en-US" altLang="ko-KR" dirty="0" smtClean="0"/>
+              <a:t>tag</a:t>
+            </a:r>
+            <a:r>
+              <a:rPr lang="ko-KR" altLang="en-US" dirty="0" smtClean="0"/>
+              <a:t>를 사용하기보단 </a:t>
+            </a:r>
+            <a:r>
+              <a:rPr lang="en-US" altLang="ko-KR" dirty="0" err="1" smtClean="0"/>
+              <a:t>git</a:t>
+            </a:r>
+            <a:r>
+              <a:rPr lang="en-US" altLang="ko-KR" dirty="0" smtClean="0"/>
+              <a:t> bash</a:t>
+            </a:r>
+            <a:r>
+              <a:rPr lang="ko-KR" altLang="en-US" dirty="0" smtClean="0"/>
+              <a:t>에서 </a:t>
+            </a:r>
+            <a:r>
+              <a:rPr lang="en-US" altLang="ko-KR" dirty="0" smtClean="0"/>
+              <a:t>tag</a:t>
+            </a:r>
+            <a:r>
+              <a:rPr lang="ko-KR" altLang="en-US" dirty="0" smtClean="0"/>
+              <a:t>를 사용하는 것이 좋으며</a:t>
+            </a:r>
+            <a:r>
+              <a:rPr lang="en-US" altLang="ko-KR" dirty="0" smtClean="0"/>
+              <a:t>, </a:t>
+            </a:r>
+            <a:r>
+              <a:rPr lang="ko-KR" altLang="en-US" dirty="0" smtClean="0"/>
+              <a:t>한번 </a:t>
+            </a:r>
+            <a:r>
+              <a:rPr lang="en-US" altLang="ko-KR" dirty="0" smtClean="0"/>
+              <a:t>push</a:t>
+            </a:r>
+            <a:r>
+              <a:rPr lang="ko-KR" altLang="en-US" dirty="0" smtClean="0"/>
+              <a:t>된 </a:t>
+            </a:r>
+            <a:r>
+              <a:rPr lang="en-US" altLang="ko-KR" dirty="0" smtClean="0"/>
+              <a:t>tag</a:t>
+            </a:r>
+            <a:r>
+              <a:rPr lang="ko-KR" altLang="en-US" dirty="0" smtClean="0"/>
+              <a:t>를 수정하면 </a:t>
+            </a:r>
+            <a:r>
+              <a:rPr lang="en-US" altLang="ko-KR" dirty="0" smtClean="0"/>
+              <a:t>Simulink</a:t>
+            </a:r>
+            <a:r>
+              <a:rPr lang="ko-KR" altLang="en-US" dirty="0" smtClean="0"/>
+              <a:t>에서 삭제는 반영이 되지 않고 추가만 되기 때문에 주의할 필요가 있다</a:t>
+            </a:r>
+            <a:r>
+              <a:rPr lang="en-US" altLang="ko-KR" dirty="0" smtClean="0"/>
+              <a:t>.</a:t>
+            </a:r>
+            <a:endParaRPr lang="en-US" altLang="ko-KR" dirty="0"/>
+          </a:p>
+          <a:p>
+            <a:pPr lvl="1">
+              <a:buSzPct val="100000"/>
+            </a:pPr>
+            <a:endParaRPr lang="en-US" altLang="ko-KR" dirty="0"/>
+          </a:p>
+          <a:p>
+            <a:pPr lvl="1">
+              <a:buSzPct val="100000"/>
+            </a:pPr>
             <a:endParaRPr lang="en-US" altLang="ko-KR" dirty="0" smtClean="0"/>
-          </a:p>
-          <a:p>
-            <a:pPr>
-              <a:buSzPct val="100000"/>
-            </a:pPr>
-            <a:r>
-              <a:rPr lang="en-US" altLang="ko-KR" dirty="0" smtClean="0"/>
-              <a:t>Merge</a:t>
-            </a:r>
-          </a:p>
-          <a:p>
-            <a:pPr>
-              <a:buSzPct val="100000"/>
-            </a:pPr>
-            <a:r>
-              <a:rPr lang="en-US" altLang="ko-KR" dirty="0" smtClean="0"/>
-              <a:t>Stash</a:t>
-            </a:r>
-          </a:p>
-          <a:p>
-            <a:pPr>
-              <a:buSzPct val="100000"/>
-            </a:pPr>
-            <a:r>
-              <a:rPr lang="en-US" altLang="ko-KR" dirty="0" smtClean="0"/>
-              <a:t>Fetch, Push, Pull</a:t>
-            </a:r>
-            <a:endParaRPr lang="ko-KR" altLang="en-US" dirty="0"/>
           </a:p>
         </p:txBody>
       </p:sp>
       <p:sp>
         <p:nvSpPr>
-          <p:cNvPr id="4" name="텍스트 개체 틀 3"/>
+          <p:cNvPr id="3" name="텍스트 개체 틀 2"/>
           <p:cNvSpPr>
             <a:spLocks noGrp="1"/>
           </p:cNvSpPr>
@@ -12783,17 +13900,237 @@
           <a:lstStyle/>
           <a:p>
             <a:r>
-              <a:rPr lang="en-US" altLang="ko-KR" dirty="0" smtClean="0"/>
-              <a:t>Contents</a:t>
+              <a:rPr lang="en-US" altLang="ko-KR" dirty="0"/>
+              <a:t>9</a:t>
+            </a:r>
+            <a:r>
+              <a:rPr lang="en-US" altLang="ko-KR" smtClean="0"/>
+              <a:t>. Tag </a:t>
+            </a:r>
+            <a:r>
+              <a:rPr lang="ko-KR" altLang="en-US" smtClean="0"/>
+              <a:t>유의사항</a:t>
             </a:r>
             <a:endParaRPr lang="ko-KR" altLang="en-US" dirty="0"/>
           </a:p>
         </p:txBody>
       </p:sp>
+      <p:pic>
+        <p:nvPicPr>
+          <p:cNvPr id="4098" name="Picture 2"/>
+          <p:cNvPicPr>
+            <a:picLocks noChangeAspect="1" noChangeArrowheads="1"/>
+          </p:cNvPicPr>
+          <p:nvPr/>
+        </p:nvPicPr>
+        <p:blipFill>
+          <a:blip r:embed="rId2">
+            <a:extLst>
+              <a:ext uri="{28A0092B-C50C-407E-A947-70E740481C1C}">
+                <a14:useLocalDpi xmlns:a14="http://schemas.microsoft.com/office/drawing/2010/main" val="0"/>
+              </a:ext>
+            </a:extLst>
+          </a:blip>
+          <a:srcRect/>
+          <a:stretch>
+            <a:fillRect/>
+          </a:stretch>
+        </p:blipFill>
+        <p:spPr bwMode="auto">
+          <a:xfrm>
+            <a:off x="5836592" y="1944836"/>
+            <a:ext cx="2695575" cy="200025"/>
+          </a:xfrm>
+          <a:prstGeom prst="rect">
+            <a:avLst/>
+          </a:prstGeom>
+          <a:noFill/>
+          <a:ln>
+            <a:noFill/>
+          </a:ln>
+          <a:extLst>
+            <a:ext uri="{909E8E84-426E-40DD-AFC4-6F175D3DCCD1}">
+              <a14:hiddenFill xmlns:a14="http://schemas.microsoft.com/office/drawing/2010/main">
+                <a:solidFill>
+                  <a:schemeClr val="accent1"/>
+                </a:solidFill>
+              </a14:hiddenFill>
+            </a:ext>
+            <a:ext uri="{91240B29-F687-4F45-9708-019B960494DF}">
+              <a14:hiddenLine xmlns:a14="http://schemas.microsoft.com/office/drawing/2010/main" w="9525">
+                <a:solidFill>
+                  <a:schemeClr val="tx1"/>
+                </a:solidFill>
+                <a:miter lim="800000"/>
+                <a:headEnd/>
+                <a:tailEnd/>
+              </a14:hiddenLine>
+            </a:ext>
+          </a:extLst>
+        </p:spPr>
+      </p:pic>
+      <p:pic>
+        <p:nvPicPr>
+          <p:cNvPr id="4099" name="Picture 3"/>
+          <p:cNvPicPr>
+            <a:picLocks noChangeAspect="1" noChangeArrowheads="1"/>
+          </p:cNvPicPr>
+          <p:nvPr/>
+        </p:nvPicPr>
+        <p:blipFill>
+          <a:blip r:embed="rId3">
+            <a:extLst>
+              <a:ext uri="{28A0092B-C50C-407E-A947-70E740481C1C}">
+                <a14:useLocalDpi xmlns:a14="http://schemas.microsoft.com/office/drawing/2010/main" val="0"/>
+              </a:ext>
+            </a:extLst>
+          </a:blip>
+          <a:srcRect/>
+          <a:stretch>
+            <a:fillRect/>
+          </a:stretch>
+        </p:blipFill>
+        <p:spPr bwMode="auto">
+          <a:xfrm>
+            <a:off x="971600" y="4437112"/>
+            <a:ext cx="6705600" cy="152400"/>
+          </a:xfrm>
+          <a:prstGeom prst="rect">
+            <a:avLst/>
+          </a:prstGeom>
+          <a:noFill/>
+          <a:ln>
+            <a:noFill/>
+          </a:ln>
+          <a:extLst>
+            <a:ext uri="{909E8E84-426E-40DD-AFC4-6F175D3DCCD1}">
+              <a14:hiddenFill xmlns:a14="http://schemas.microsoft.com/office/drawing/2010/main">
+                <a:solidFill>
+                  <a:schemeClr val="accent1"/>
+                </a:solidFill>
+              </a14:hiddenFill>
+            </a:ext>
+            <a:ext uri="{91240B29-F687-4F45-9708-019B960494DF}">
+              <a14:hiddenLine xmlns:a14="http://schemas.microsoft.com/office/drawing/2010/main" w="9525">
+                <a:solidFill>
+                  <a:schemeClr val="tx1"/>
+                </a:solidFill>
+                <a:miter lim="800000"/>
+                <a:headEnd/>
+                <a:tailEnd/>
+              </a14:hiddenLine>
+            </a:ext>
+          </a:extLst>
+        </p:spPr>
+      </p:pic>
+      <p:grpSp>
+        <p:nvGrpSpPr>
+          <p:cNvPr id="15" name="그룹 14"/>
+          <p:cNvGrpSpPr/>
+          <p:nvPr/>
+        </p:nvGrpSpPr>
+        <p:grpSpPr>
+          <a:xfrm>
+            <a:off x="971600" y="4725144"/>
+            <a:ext cx="7067550" cy="457200"/>
+            <a:chOff x="971600" y="4725144"/>
+            <a:chExt cx="7067550" cy="457200"/>
+          </a:xfrm>
+        </p:grpSpPr>
+        <p:pic>
+          <p:nvPicPr>
+            <p:cNvPr id="4100" name="Picture 4"/>
+            <p:cNvPicPr>
+              <a:picLocks noChangeAspect="1" noChangeArrowheads="1"/>
+            </p:cNvPicPr>
+            <p:nvPr/>
+          </p:nvPicPr>
+          <p:blipFill>
+            <a:blip r:embed="rId4">
+              <a:extLst>
+                <a:ext uri="{28A0092B-C50C-407E-A947-70E740481C1C}">
+                  <a14:useLocalDpi xmlns:a14="http://schemas.microsoft.com/office/drawing/2010/main" val="0"/>
+                </a:ext>
+              </a:extLst>
+            </a:blip>
+            <a:srcRect/>
+            <a:stretch>
+              <a:fillRect/>
+            </a:stretch>
+          </p:blipFill>
+          <p:spPr bwMode="auto">
+            <a:xfrm>
+              <a:off x="971600" y="4725144"/>
+              <a:ext cx="7067550" cy="457200"/>
+            </a:xfrm>
+            <a:prstGeom prst="rect">
+              <a:avLst/>
+            </a:prstGeom>
+            <a:noFill/>
+            <a:ln>
+              <a:noFill/>
+            </a:ln>
+            <a:extLst>
+              <a:ext uri="{909E8E84-426E-40DD-AFC4-6F175D3DCCD1}">
+                <a14:hiddenFill xmlns:a14="http://schemas.microsoft.com/office/drawing/2010/main">
+                  <a:solidFill>
+                    <a:schemeClr val="accent1"/>
+                  </a:solidFill>
+                </a14:hiddenFill>
+              </a:ext>
+              <a:ext uri="{91240B29-F687-4F45-9708-019B960494DF}">
+                <a14:hiddenLine xmlns:a14="http://schemas.microsoft.com/office/drawing/2010/main" w="9525">
+                  <a:solidFill>
+                    <a:schemeClr val="tx1"/>
+                  </a:solidFill>
+                  <a:miter lim="800000"/>
+                  <a:headEnd/>
+                  <a:tailEnd/>
+                </a14:hiddenLine>
+              </a:ext>
+            </a:extLst>
+          </p:spPr>
+        </p:pic>
+        <p:cxnSp>
+          <p:nvCxnSpPr>
+            <p:cNvPr id="13" name="직선 연결선 12"/>
+            <p:cNvCxnSpPr/>
+            <p:nvPr/>
+          </p:nvCxnSpPr>
+          <p:spPr>
+            <a:xfrm>
+              <a:off x="6228184" y="5085184"/>
+              <a:ext cx="504056" cy="0"/>
+            </a:xfrm>
+            <a:prstGeom prst="line">
+              <a:avLst/>
+            </a:prstGeom>
+            <a:ln w="38100">
+              <a:solidFill>
+                <a:srgbClr val="FF0000"/>
+              </a:solidFill>
+            </a:ln>
+          </p:spPr>
+          <p:style>
+            <a:lnRef idx="2">
+              <a:schemeClr val="accent1"/>
+            </a:lnRef>
+            <a:fillRef idx="0">
+              <a:schemeClr val="accent1"/>
+            </a:fillRef>
+            <a:effectRef idx="1">
+              <a:schemeClr val="accent1"/>
+            </a:effectRef>
+            <a:fontRef idx="minor">
+              <a:schemeClr val="tx1"/>
+            </a:fontRef>
+          </p:style>
+        </p:cxnSp>
+      </p:grpSp>
     </p:spTree>
     <p:extLst>
       <p:ext uri="{BB962C8B-B14F-4D97-AF65-F5344CB8AC3E}">
-        <p14:creationId xmlns:p14="http://schemas.microsoft.com/office/powerpoint/2010/main" val="3462241943"/>
+        <p14:creationId xmlns:p14="http://schemas.microsoft.com/office/powerpoint/2010/main" val="3151773635"/>
       </p:ext>
     </p:extLst>
   </p:cSld>
@@ -12890,7 +14227,32 @@
             </a:pPr>
             <a:r>
               <a:rPr lang="ko-KR" altLang="en-US" dirty="0" smtClean="0"/>
-              <a:t>소스컨트롤 사용</a:t>
+              <a:t>소스컨트롤 </a:t>
+            </a:r>
+            <a:r>
+              <a:rPr lang="ko-KR" altLang="en-US" dirty="0" smtClean="0"/>
+              <a:t>사용</a:t>
+            </a:r>
+            <a:endParaRPr lang="en-US" altLang="ko-KR" dirty="0" smtClean="0"/>
+          </a:p>
+          <a:p>
+            <a:pPr lvl="1">
+              <a:buSzPct val="100000"/>
+            </a:pPr>
+            <a:r>
+              <a:rPr lang="ko-KR" altLang="en-US" dirty="0" smtClean="0"/>
+              <a:t>해당 폴더에 대하여 </a:t>
+            </a:r>
+            <a:r>
+              <a:rPr lang="en-US" altLang="ko-KR" dirty="0" smtClean="0"/>
+              <a:t/>
+            </a:r>
+            <a:br>
+              <a:rPr lang="en-US" altLang="ko-KR" dirty="0" smtClean="0"/>
+            </a:br>
+            <a:r>
+              <a:rPr lang="ko-KR" altLang="en-US" dirty="0" smtClean="0"/>
+              <a:t>버전관리를 시작</a:t>
             </a:r>
             <a:endParaRPr lang="en-US" altLang="ko-KR" dirty="0" smtClean="0"/>
           </a:p>
@@ -13185,6 +14547,13 @@
       </p:transition>
     </mc:Fallback>
   </mc:AlternateContent>
+  <p:timing>
+    <p:tnLst>
+      <p:par>
+        <p:cTn id="1" dur="indefinite" restart="never" nodeType="tmRoot"/>
+      </p:par>
+    </p:tnLst>
+  </p:timing>
 </p:sld>
 </file>
 
@@ -13643,8 +15012,17 @@
             </a:r>
             <a:r>
               <a:rPr lang="en-US" altLang="ko-KR" dirty="0" smtClean="0"/>
-              <a:t> clone</a:t>
-            </a:r>
+              <a:t> </a:t>
+            </a:r>
+            <a:r>
+              <a:rPr lang="en-US" altLang="ko-KR" dirty="0" smtClean="0"/>
+              <a:t>clone – </a:t>
+            </a:r>
+            <a:r>
+              <a:rPr lang="ko-KR" altLang="en-US" dirty="0" smtClean="0"/>
+              <a:t>이미 존재하는 원격저장소를 연결</a:t>
+            </a:r>
+            <a:endParaRPr lang="en-US" altLang="ko-KR" dirty="0" smtClean="0"/>
           </a:p>
           <a:p>
             <a:pPr lvl="1">
@@ -13672,7 +15050,23 @@
             </a:r>
             <a:r>
               <a:rPr lang="ko-KR" altLang="en-US" dirty="0" smtClean="0"/>
-              <a:t>옵션 선택</a:t>
+              <a:t>옵션</a:t>
+            </a:r>
+            <a:r>
+              <a:rPr lang="ko-KR" altLang="en-US" dirty="0"/>
+              <a:t>을</a:t>
+            </a:r>
+            <a:r>
+              <a:rPr lang="ko-KR" altLang="en-US" dirty="0" smtClean="0"/>
+              <a:t> </a:t>
+            </a:r>
+            <a:r>
+              <a:rPr lang="ko-KR" altLang="en-US" dirty="0" smtClean="0"/>
+              <a:t>선택한다</a:t>
+            </a:r>
+            <a:r>
+              <a:rPr lang="en-US" altLang="ko-KR" dirty="0" smtClean="0"/>
+              <a:t>.</a:t>
             </a:r>
             <a:endParaRPr lang="en-US" altLang="ko-KR" dirty="0"/>
           </a:p>
@@ -13706,9 +15100,12 @@
             </a:pPr>
             <a:r>
               <a:rPr lang="ko-KR" altLang="en-US" dirty="0" smtClean="0"/>
-              <a:t>필수적으로 빈 폴더를 선택</a:t>
-            </a:r>
-            <a:endParaRPr lang="en-US" altLang="ko-KR" dirty="0" smtClean="0"/>
+              <a:t>필수적으로 빈 폴더를 선택해야 한다</a:t>
+            </a:r>
+            <a:r>
+              <a:rPr lang="en-US" altLang="ko-KR" dirty="0" smtClean="0"/>
+              <a:t>.</a:t>
+            </a:r>
           </a:p>
           <a:p>
             <a:pPr lvl="1">
@@ -13752,11 +15149,7 @@
             </a:r>
             <a:r>
               <a:rPr lang="ko-KR" altLang="en-US" dirty="0" smtClean="0"/>
-              <a:t>파일 </a:t>
-            </a:r>
-            <a:r>
-              <a:rPr lang="ko-KR" altLang="en-US" dirty="0" smtClean="0"/>
-              <a:t>생성 지시를</a:t>
+              <a:t>파일 생성 지시를</a:t>
             </a:r>
             <a:r>
               <a:rPr lang="en-US" altLang="ko-KR" dirty="0" smtClean="0"/>
@@ -13764,9 +15157,12 @@
             </a:r>
             <a:r>
               <a:rPr lang="ko-KR" altLang="en-US" dirty="0" smtClean="0"/>
-              <a:t>받게 됨</a:t>
-            </a:r>
-            <a:endParaRPr lang="en-US" altLang="ko-KR" dirty="0" smtClean="0"/>
+              <a:t>받게 된다</a:t>
+            </a:r>
+            <a:r>
+              <a:rPr lang="en-US" altLang="ko-KR" dirty="0" smtClean="0"/>
+              <a:t>.</a:t>
+            </a:r>
           </a:p>
         </p:txBody>
       </p:sp>
@@ -13951,32 +15347,35 @@
             </a:r>
             <a:r>
               <a:rPr lang="ko-KR" altLang="en-US" dirty="0" smtClean="0"/>
-              <a:t>폴더가 나타남</a:t>
-            </a:r>
+              <a:t>폴더가 나타난다</a:t>
+            </a:r>
+            <a:r>
+              <a:rPr lang="en-US" altLang="ko-KR" dirty="0" smtClean="0"/>
+              <a:t>.</a:t>
+            </a:r>
+          </a:p>
+          <a:p>
+            <a:pPr lvl="1">
+              <a:buSzPct val="100000"/>
+            </a:pPr>
+            <a:endParaRPr lang="en-US" altLang="ko-KR" dirty="0"/>
+          </a:p>
+          <a:p>
+            <a:pPr lvl="1">
+              <a:buSzPct val="100000"/>
+            </a:pPr>
             <a:endParaRPr lang="en-US" altLang="ko-KR" dirty="0" smtClean="0"/>
           </a:p>
           <a:p>
             <a:pPr lvl="1">
               <a:buSzPct val="100000"/>
             </a:pPr>
-            <a:endParaRPr lang="en-US" altLang="ko-KR" dirty="0"/>
-          </a:p>
-          <a:p>
-            <a:pPr lvl="1">
-              <a:buSzPct val="100000"/>
-            </a:pPr>
             <a:endParaRPr lang="en-US" altLang="ko-KR" dirty="0" smtClean="0"/>
           </a:p>
           <a:p>
             <a:pPr lvl="1">
               <a:buSzPct val="100000"/>
             </a:pPr>
-            <a:endParaRPr lang="en-US" altLang="ko-KR" dirty="0" smtClean="0"/>
-          </a:p>
-          <a:p>
-            <a:pPr lvl="1">
-              <a:buSzPct val="100000"/>
-            </a:pPr>
             <a:r>
               <a:rPr lang="en-US" altLang="ko-KR" dirty="0" smtClean="0"/>
               <a:t>‘</a:t>
@@ -13987,13 +15386,20 @@
             </a:r>
             <a:r>
               <a:rPr lang="en-US" altLang="ko-KR" dirty="0" smtClean="0"/>
-              <a:t>’</a:t>
-            </a:r>
-            <a:r>
-              <a:rPr lang="ko-KR" altLang="en-US" dirty="0" smtClean="0"/>
-              <a:t>탭에서 프로젝트에 쓰이는 파일이 표시됨</a:t>
-            </a:r>
-            <a:endParaRPr lang="en-US" altLang="ko-KR" dirty="0" smtClean="0"/>
+              <a:t>’ </a:t>
+            </a:r>
+            <a:r>
+              <a:rPr lang="ko-KR" altLang="en-US" dirty="0" smtClean="0"/>
+              <a:t>탭에서 </a:t>
+            </a:r>
+            <a:r>
+              <a:rPr lang="ko-KR" altLang="en-US" dirty="0" smtClean="0"/>
+              <a:t>프로젝트에 쓰이는 파일이 표시된다</a:t>
+            </a:r>
+            <a:r>
+              <a:rPr lang="en-US" altLang="ko-KR" dirty="0" smtClean="0"/>
+              <a:t>.</a:t>
+            </a:r>
           </a:p>
           <a:p>
             <a:pPr lvl="1">
@@ -14065,9 +15471,12 @@
             </a:r>
             <a:r>
               <a:rPr lang="ko-KR" altLang="en-US" dirty="0" smtClean="0"/>
-              <a:t>에 표시됨</a:t>
-            </a:r>
-            <a:endParaRPr lang="en-US" altLang="ko-KR" dirty="0" smtClean="0"/>
+              <a:t>에 표시된다</a:t>
+            </a:r>
+            <a:r>
+              <a:rPr lang="en-US" altLang="ko-KR" dirty="0" smtClean="0"/>
+              <a:t>.</a:t>
+            </a:r>
           </a:p>
           <a:p>
             <a:pPr lvl="2">
@@ -14083,17 +15492,24 @@
             </a:r>
             <a:r>
               <a:rPr lang="ko-KR" altLang="en-US" dirty="0" smtClean="0"/>
-              <a:t>수정</a:t>
-            </a:r>
-            <a:r>
-              <a:rPr lang="en-US" altLang="ko-KR" dirty="0" smtClean="0"/>
-              <a:t>’</a:t>
-            </a:r>
-            <a:r>
-              <a:rPr lang="ko-KR" altLang="en-US" dirty="0" smtClean="0"/>
-              <a:t>탭에 표시됨</a:t>
-            </a:r>
-            <a:endParaRPr lang="en-US" altLang="ko-KR" dirty="0" smtClean="0"/>
+              <a:t>수정됨</a:t>
+            </a:r>
+            <a:r>
+              <a:rPr lang="en-US" altLang="ko-KR" dirty="0" smtClean="0"/>
+              <a:t>’ </a:t>
+            </a:r>
+            <a:r>
+              <a:rPr lang="ko-KR" altLang="en-US" dirty="0" smtClean="0"/>
+              <a:t>에 </a:t>
+            </a:r>
+            <a:r>
+              <a:rPr lang="ko-KR" altLang="en-US" dirty="0" smtClean="0"/>
+              <a:t>파일이 표시된다</a:t>
+            </a:r>
+            <a:r>
+              <a:rPr lang="en-US" altLang="ko-KR" dirty="0" smtClean="0"/>
+              <a:t>.</a:t>
+            </a:r>
           </a:p>
           <a:p>
             <a:pPr lvl="1">
@@ -14128,57 +15544,9 @@
               <a:t>에 포함되지 않은 파일을 포함시키고자 할 경우 파일추가를 해야 한다</a:t>
             </a:r>
             <a:r>
-              <a:rPr lang="en-US" altLang="ko-KR" dirty="0"/>
+              <a:rPr lang="en-US" altLang="ko-KR" dirty="0" smtClean="0"/>
               <a:t>.</a:t>
             </a:r>
-            <a:endParaRPr lang="en-US" altLang="ko-KR" dirty="0" smtClean="0"/>
-          </a:p>
-          <a:p>
-            <a:pPr>
-              <a:buSzPct val="100000"/>
-            </a:pPr>
-            <a:endParaRPr lang="en-US" altLang="ko-KR" dirty="0" smtClean="0"/>
-          </a:p>
-          <a:p>
-            <a:pPr lvl="1">
-              <a:buSzPct val="100000"/>
-            </a:pPr>
-            <a:endParaRPr lang="en-US" altLang="ko-KR" dirty="0"/>
-          </a:p>
-          <a:p>
-            <a:pPr lvl="1">
-              <a:buSzPct val="100000"/>
-            </a:pPr>
-            <a:endParaRPr lang="en-US" altLang="ko-KR" dirty="0" smtClean="0"/>
-          </a:p>
-          <a:p>
-            <a:pPr lvl="1">
-              <a:buSzPct val="100000"/>
-            </a:pPr>
-            <a:endParaRPr lang="en-US" altLang="ko-KR" dirty="0"/>
-          </a:p>
-          <a:p>
-            <a:pPr lvl="1">
-              <a:buSzPct val="100000"/>
-            </a:pPr>
-            <a:endParaRPr lang="en-US" altLang="ko-KR" dirty="0" smtClean="0"/>
-          </a:p>
-          <a:p>
-            <a:pPr lvl="1">
-              <a:buSzPct val="100000"/>
-            </a:pPr>
-            <a:endParaRPr lang="en-US" altLang="ko-KR" dirty="0"/>
-          </a:p>
-          <a:p>
-            <a:pPr lvl="1">
-              <a:buSzPct val="100000"/>
-            </a:pPr>
-            <a:endParaRPr lang="en-US" altLang="ko-KR" dirty="0"/>
-          </a:p>
-          <a:p>
-            <a:pPr lvl="1">
-              <a:buSzPct val="100000"/>
-            </a:pPr>
             <a:endParaRPr lang="en-US" altLang="ko-KR" dirty="0" smtClean="0"/>
           </a:p>
         </p:txBody>
@@ -14459,9 +15827,28 @@
             </a:r>
             <a:r>
               <a:rPr lang="ko-KR" altLang="en-US" dirty="0" smtClean="0"/>
-              <a:t>가 생성되고 이를 확인 할 수 있음</a:t>
-            </a:r>
-            <a:endParaRPr lang="en-US" altLang="ko-KR" dirty="0" smtClean="0"/>
+              <a:t>가 </a:t>
+            </a:r>
+            <a:r>
+              <a:rPr lang="ko-KR" altLang="en-US" dirty="0" smtClean="0"/>
+              <a:t>생성되고</a:t>
+            </a:r>
+            <a:r>
+              <a:rPr lang="en-US" altLang="ko-KR" dirty="0" smtClean="0"/>
+              <a:t>,</a:t>
+            </a:r>
+            <a:r>
+              <a:rPr lang="ko-KR" altLang="en-US" dirty="0" smtClean="0"/>
+              <a:t> </a:t>
+            </a:r>
+            <a:r>
+              <a:rPr lang="ko-KR" altLang="en-US" dirty="0" smtClean="0"/>
+              <a:t>이를 확인 할 수 있다</a:t>
+            </a:r>
+            <a:r>
+              <a:rPr lang="en-US" altLang="ko-KR" dirty="0" smtClean="0"/>
+              <a:t>.</a:t>
+            </a:r>
           </a:p>
           <a:p>
             <a:pPr lvl="1">
@@ -14771,9 +16158,12 @@
             </a:r>
             <a:r>
               <a:rPr lang="ko-KR" altLang="en-US" dirty="0" smtClean="0"/>
-              <a:t>기능에 해당</a:t>
-            </a:r>
-            <a:endParaRPr lang="en-US" altLang="ko-KR" dirty="0" smtClean="0"/>
+              <a:t>기능에 해당한다</a:t>
+            </a:r>
+            <a:r>
+              <a:rPr lang="en-US" altLang="ko-KR" dirty="0" smtClean="0"/>
+              <a:t>.</a:t>
+            </a:r>
           </a:p>
           <a:p>
             <a:pPr lvl="1">
@@ -14843,7 +16233,11 @@
             </a:r>
             <a:r>
               <a:rPr lang="ko-KR" altLang="en-US" dirty="0" smtClean="0"/>
-              <a:t> 태그 생성</a:t>
+              <a:t> 태그 </a:t>
+            </a:r>
+            <a:r>
+              <a:rPr lang="ko-KR" altLang="en-US" dirty="0" smtClean="0"/>
+              <a:t>생성</a:t>
             </a:r>
             <a:endParaRPr lang="en-US" altLang="ko-KR" dirty="0" smtClean="0"/>
           </a:p>
@@ -14853,15 +16247,15 @@
             </a:pPr>
             <a:r>
               <a:rPr lang="ko-KR" altLang="en-US" dirty="0" smtClean="0"/>
-              <a:t>현재 </a:t>
-            </a:r>
-            <a:r>
-              <a:rPr lang="en-US" altLang="ko-KR" dirty="0" smtClean="0"/>
-              <a:t>HEAD</a:t>
-            </a:r>
-            <a:r>
-              <a:rPr lang="ko-KR" altLang="en-US" dirty="0" smtClean="0"/>
-              <a:t>가 위치한 곳에서 </a:t>
+              <a:t>특정 </a:t>
+            </a:r>
+            <a:r>
+              <a:rPr lang="en-US" altLang="ko-KR" dirty="0" smtClean="0"/>
+              <a:t>commit</a:t>
+            </a:r>
+            <a:r>
+              <a:rPr lang="ko-KR" altLang="en-US" dirty="0" smtClean="0"/>
+              <a:t>에서 </a:t>
             </a:r>
             <a:r>
               <a:rPr lang="en-US" altLang="ko-KR" dirty="0" smtClean="0"/>
@@ -14877,7 +16271,71 @@
             </a:r>
             <a:r>
               <a:rPr lang="ko-KR" altLang="en-US" dirty="0" smtClean="0"/>
-              <a:t>를 생성</a:t>
+              <a:t>를 </a:t>
+            </a:r>
+            <a:r>
+              <a:rPr lang="ko-KR" altLang="en-US" dirty="0" smtClean="0"/>
+              <a:t>생성</a:t>
+            </a:r>
+            <a:endParaRPr lang="en-US" altLang="ko-KR" dirty="0" smtClean="0"/>
+          </a:p>
+          <a:p>
+            <a:pPr>
+              <a:buSzPct val="100000"/>
+            </a:pPr>
+            <a:r>
+              <a:rPr lang="ko-KR" altLang="en-US" dirty="0" err="1" smtClean="0"/>
+              <a:t>브랜치</a:t>
+            </a:r>
+            <a:r>
+              <a:rPr lang="ko-KR" altLang="en-US" dirty="0" smtClean="0"/>
+              <a:t> 삭제</a:t>
+            </a:r>
+            <a:endParaRPr lang="en-US" altLang="ko-KR" dirty="0" smtClean="0"/>
+          </a:p>
+          <a:p>
+            <a:pPr lvl="1">
+              <a:buSzPct val="100000"/>
+            </a:pPr>
+            <a:r>
+              <a:rPr lang="ko-KR" altLang="en-US" dirty="0" smtClean="0"/>
+              <a:t>삭제하려는 </a:t>
+            </a:r>
+            <a:r>
+              <a:rPr lang="ko-KR" altLang="en-US" dirty="0" err="1" smtClean="0"/>
+              <a:t>브랜치를</a:t>
+            </a:r>
+            <a:r>
+              <a:rPr lang="ko-KR" altLang="en-US" dirty="0" smtClean="0"/>
+              <a:t> </a:t>
+            </a:r>
+            <a:r>
+              <a:rPr lang="ko-KR" altLang="en-US" dirty="0" err="1" smtClean="0"/>
+              <a:t>브랜치</a:t>
+            </a:r>
+            <a:r>
+              <a:rPr lang="ko-KR" altLang="en-US" dirty="0" smtClean="0"/>
+              <a:t> 브라우저에서 선택한 후</a:t>
+            </a:r>
+            <a:r>
+              <a:rPr lang="en-US" altLang="ko-KR" dirty="0" smtClean="0"/>
+              <a:t>,    </a:t>
+            </a:r>
+            <a:r>
+              <a:rPr lang="ko-KR" altLang="en-US" dirty="0" smtClean="0"/>
+              <a:t>아래에 </a:t>
+            </a:r>
+            <a:r>
+              <a:rPr lang="ko-KR" altLang="en-US" dirty="0" err="1" smtClean="0"/>
+              <a:t>브랜치</a:t>
+            </a:r>
+            <a:r>
+              <a:rPr lang="ko-KR" altLang="en-US" dirty="0" smtClean="0"/>
+              <a:t> 삭제를 클릭하여 삭제할 수 있다</a:t>
+            </a:r>
+            <a:r>
+              <a:rPr lang="en-US" altLang="ko-KR" dirty="0" smtClean="0"/>
+              <a:t>.</a:t>
             </a:r>
             <a:endParaRPr lang="en-US" altLang="ko-KR" dirty="0" smtClean="0"/>
           </a:p>
@@ -14997,6 +16455,114 @@
           <a:xfrm>
             <a:off x="5724128" y="764704"/>
             <a:ext cx="3096344" cy="1026505"/>
+          </a:xfrm>
+          <a:prstGeom prst="rect">
+            <a:avLst/>
+          </a:prstGeom>
+          <a:noFill/>
+          <a:ln>
+            <a:noFill/>
+          </a:ln>
+          <a:extLst>
+            <a:ext uri="{909E8E84-426E-40DD-AFC4-6F175D3DCCD1}">
+              <a14:hiddenFill xmlns:a14="http://schemas.microsoft.com/office/drawing/2010/main">
+                <a:solidFill>
+                  <a:schemeClr val="accent1"/>
+                </a:solidFill>
+              </a14:hiddenFill>
+            </a:ext>
+            <a:ext uri="{91240B29-F687-4F45-9708-019B960494DF}">
+              <a14:hiddenLine xmlns:a14="http://schemas.microsoft.com/office/drawing/2010/main" w="9525">
+                <a:solidFill>
+                  <a:schemeClr val="tx1"/>
+                </a:solidFill>
+                <a:miter lim="800000"/>
+                <a:headEnd/>
+                <a:tailEnd/>
+              </a14:hiddenLine>
+            </a:ext>
+          </a:extLst>
+        </p:spPr>
+      </p:pic>
+      <p:pic>
+        <p:nvPicPr>
+          <p:cNvPr id="1026" name="Picture 2"/>
+          <p:cNvPicPr>
+            <a:picLocks noChangeAspect="1" noChangeArrowheads="1"/>
+          </p:cNvPicPr>
+          <p:nvPr/>
+        </p:nvPicPr>
+        <p:blipFill>
+          <a:blip r:embed="rId3">
+            <a:extLst>
+              <a:ext uri="{28A0092B-C50C-407E-A947-70E740481C1C}">
+                <a14:useLocalDpi xmlns:a14="http://schemas.microsoft.com/office/drawing/2010/main" val="0"/>
+              </a:ext>
+            </a:extLst>
+          </a:blip>
+          <a:srcRect/>
+          <a:stretch>
+            <a:fillRect/>
+          </a:stretch>
+        </p:blipFill>
+        <p:spPr bwMode="auto">
+          <a:xfrm>
+            <a:off x="2843808" y="5687387"/>
+            <a:ext cx="1619250" cy="571500"/>
+          </a:xfrm>
+          <a:prstGeom prst="rect">
+            <a:avLst/>
+          </a:prstGeom>
+          <a:noFill/>
+          <a:ln>
+            <a:noFill/>
+          </a:ln>
+          <a:extLst>
+            <a:ext uri="{909E8E84-426E-40DD-AFC4-6F175D3DCCD1}">
+              <a14:hiddenFill xmlns:a14="http://schemas.microsoft.com/office/drawing/2010/main">
+                <a:solidFill>
+                  <a:schemeClr val="accent1"/>
+                </a:solidFill>
+              </a14:hiddenFill>
+            </a:ext>
+            <a:ext uri="{91240B29-F687-4F45-9708-019B960494DF}">
+              <a14:hiddenLine xmlns:a14="http://schemas.microsoft.com/office/drawing/2010/main" w="9525">
+                <a:solidFill>
+                  <a:schemeClr val="tx1"/>
+                </a:solidFill>
+                <a:miter lim="800000"/>
+                <a:headEnd/>
+                <a:tailEnd/>
+              </a14:hiddenLine>
+            </a:ext>
+          </a:extLst>
+        </p:spPr>
+      </p:pic>
+      <p:pic>
+        <p:nvPicPr>
+          <p:cNvPr id="1027" name="Picture 3"/>
+          <p:cNvPicPr>
+            <a:picLocks noChangeAspect="1" noChangeArrowheads="1"/>
+          </p:cNvPicPr>
+          <p:nvPr/>
+        </p:nvPicPr>
+        <p:blipFill>
+          <a:blip r:embed="rId4">
+            <a:extLst>
+              <a:ext uri="{28A0092B-C50C-407E-A947-70E740481C1C}">
+                <a14:useLocalDpi xmlns:a14="http://schemas.microsoft.com/office/drawing/2010/main" val="0"/>
+              </a:ext>
+            </a:extLst>
+          </a:blip>
+          <a:srcRect/>
+          <a:stretch>
+            <a:fillRect/>
+          </a:stretch>
+        </p:blipFill>
+        <p:spPr bwMode="auto">
+          <a:xfrm>
+            <a:off x="5796136" y="5373216"/>
+            <a:ext cx="171450" cy="304800"/>
           </a:xfrm>
           <a:prstGeom prst="rect">
             <a:avLst/>
@@ -15097,6 +16663,20 @@
               <a:buSzPct val="100000"/>
             </a:pPr>
             <a:r>
+              <a:rPr lang="en-US" altLang="ko-KR" dirty="0" smtClean="0"/>
+              <a:t>Simulink</a:t>
+            </a:r>
+            <a:r>
+              <a:rPr lang="ko-KR" altLang="en-US" dirty="0" smtClean="0"/>
+              <a:t>에서는 하나의 파일에 대해서만 비교 가능</a:t>
+            </a:r>
+            <a:endParaRPr lang="en-US" altLang="ko-KR" dirty="0" smtClean="0"/>
+          </a:p>
+          <a:p>
+            <a:pPr lvl="1">
+              <a:buSzPct val="100000"/>
+            </a:pPr>
+            <a:r>
               <a:rPr lang="ko-KR" altLang="en-US" dirty="0" smtClean="0"/>
               <a:t>비교할 모델을 마우스 우 클릭 하여 비교</a:t>
             </a:r>
@@ -15158,19 +16738,15 @@
             </a:pPr>
             <a:r>
               <a:rPr lang="ko-KR" altLang="en-US" dirty="0" smtClean="0"/>
-              <a:t>로컬 파일과 비교 </a:t>
-            </a:r>
-            <a:r>
-              <a:rPr lang="en-US" altLang="ko-KR" dirty="0" smtClean="0"/>
-              <a:t>: Branch log</a:t>
-            </a:r>
-            <a:r>
-              <a:rPr lang="ko-KR" altLang="en-US" dirty="0" smtClean="0"/>
-              <a:t>가 표시되어 </a:t>
-            </a:r>
-            <a:r>
-              <a:rPr lang="en-US" altLang="ko-KR" dirty="0" smtClean="0"/>
-              <a:t>Commit</a:t>
+              <a:t>로컬 </a:t>
+            </a:r>
+            <a:r>
+              <a:rPr lang="ko-KR" altLang="en-US" dirty="0" smtClean="0"/>
+              <a:t>파일과 비교 </a:t>
+            </a:r>
+            <a:r>
+              <a:rPr lang="en-US" altLang="ko-KR" dirty="0" smtClean="0"/>
+              <a:t>: Commit</a:t>
             </a:r>
             <a:r>
               <a:rPr lang="ko-KR" altLang="en-US" dirty="0" smtClean="0"/>
@@ -15200,7 +16776,7 @@
             </a:r>
             <a:r>
               <a:rPr lang="ko-KR" altLang="en-US" dirty="0" smtClean="0"/>
-              <a:t>이전의 </a:t>
+              <a:t>이전 </a:t>
             </a:r>
             <a:r>
               <a:rPr lang="en-US" altLang="ko-KR" dirty="0" smtClean="0"/>
@@ -15208,7 +16784,7 @@
             </a:r>
             <a:r>
               <a:rPr lang="ko-KR" altLang="en-US" dirty="0" smtClean="0"/>
-              <a:t>에 대한 </a:t>
+              <a:t> </a:t>
             </a:r>
             <a:r>
               <a:rPr lang="en-US" altLang="ko-KR" dirty="0" smtClean="0"/>
@@ -15276,7 +16852,7 @@
         </p:blipFill>
         <p:spPr bwMode="auto">
           <a:xfrm>
-            <a:off x="611561" y="1628800"/>
+            <a:off x="611561" y="2055741"/>
             <a:ext cx="4032447" cy="3101451"/>
           </a:xfrm>
           <a:prstGeom prst="rect">

</xml_diff>

<commit_message>
fix typo in source control ppt
</commit_message>
<xml_diff>
--- a/Simulink Source Control.pptx
+++ b/Simulink Source Control.pptx
@@ -6811,7 +6811,7 @@
           <a:p>
             <a:fld id="{F7419D33-7494-40C4-AC0B-AE730A9A4A91}" type="datetimeFigureOut">
               <a:rPr lang="ko-KR" altLang="en-US" smtClean="0"/>
-              <a:t>2020-01-02</a:t>
+              <a:t>2020-01-03</a:t>
             </a:fld>
             <a:endParaRPr lang="ko-KR" altLang="en-US"/>
           </a:p>
@@ -9316,11 +9316,7 @@
             </a:r>
             <a:r>
               <a:rPr lang="ko-KR" altLang="en-US" dirty="0" smtClean="0"/>
-              <a:t>를 클릭하면 오른쪽 모델에 </a:t>
-            </a:r>
-            <a:r>
-              <a:rPr lang="ko-KR" altLang="en-US" dirty="0" smtClean="0"/>
-              <a:t>강조됨</a:t>
+              <a:t>를 클릭하면 오른쪽 모델에 강조됨</a:t>
             </a:r>
             <a:endParaRPr lang="en-US" altLang="ko-KR" dirty="0" smtClean="0"/>
           </a:p>
@@ -9964,11 +9960,7 @@
             </a:r>
             <a:r>
               <a:rPr lang="ko-KR" altLang="en-US" dirty="0" smtClean="0"/>
-              <a:t>모두 변경되어 충돌이 발생하였다고 </a:t>
-            </a:r>
-            <a:r>
-              <a:rPr lang="ko-KR" altLang="en-US" dirty="0" smtClean="0"/>
-              <a:t>표시된다</a:t>
+              <a:t>모두 변경되어 충돌이 발생하였다고 표시된다</a:t>
             </a:r>
             <a:r>
               <a:rPr lang="en-US" altLang="ko-KR" dirty="0" smtClean="0"/>
@@ -10644,7 +10636,7 @@
             </a:r>
             <a:r>
               <a:rPr lang="en-US" altLang="ko-KR" dirty="0" err="1" smtClean="0"/>
-              <a:t>targerfile</a:t>
+              <a:t>targetfile</a:t>
             </a:r>
             <a:r>
               <a:rPr lang="en-US" altLang="ko-KR" dirty="0" smtClean="0"/>
@@ -11020,19 +11012,7 @@
           <a:p>
             <a:r>
               <a:rPr lang="en-US" altLang="ko-KR" dirty="0" smtClean="0"/>
-              <a:t>6. </a:t>
-            </a:r>
-            <a:r>
-              <a:rPr lang="en-US" altLang="ko-KR" dirty="0" smtClean="0"/>
-              <a:t>Merge(</a:t>
-            </a:r>
-            <a:r>
-              <a:rPr lang="en-US" altLang="ko-KR" dirty="0" smtClean="0"/>
-              <a:t>IV</a:t>
-            </a:r>
-            <a:r>
-              <a:rPr lang="en-US" altLang="ko-KR" dirty="0" smtClean="0"/>
-              <a:t>)</a:t>
+              <a:t>6. Merge(IV)</a:t>
             </a:r>
             <a:endParaRPr lang="ko-KR" altLang="en-US" dirty="0"/>
           </a:p>
@@ -11425,19 +11405,11 @@
             </a:pPr>
             <a:r>
               <a:rPr lang="en-US" altLang="ko-KR" dirty="0" smtClean="0"/>
-              <a:t>Target </a:t>
-            </a:r>
-            <a:r>
-              <a:rPr lang="en-US" altLang="ko-KR" dirty="0" smtClean="0"/>
-              <a:t>model</a:t>
-            </a:r>
-            <a:r>
-              <a:rPr lang="ko-KR" altLang="en-US" dirty="0" smtClean="0"/>
-              <a:t>수정을 한 후</a:t>
-            </a:r>
-            <a:r>
-              <a:rPr lang="ko-KR" altLang="en-US" dirty="0" smtClean="0"/>
-              <a:t> </a:t>
+              <a:t>Target model</a:t>
+            </a:r>
+            <a:r>
+              <a:rPr lang="ko-KR" altLang="en-US" dirty="0" smtClean="0"/>
+              <a:t>수정을 한 후 </a:t>
             </a:r>
             <a:r>
               <a:rPr lang="en-US" altLang="ko-KR" dirty="0" smtClean="0"/>
@@ -11487,7 +11459,6 @@
               <a:rPr lang="en-US" altLang="ko-KR" dirty="0" smtClean="0"/>
               <a:t>.</a:t>
             </a:r>
-            <a:endParaRPr lang="en-US" altLang="ko-KR" dirty="0" smtClean="0"/>
           </a:p>
         </p:txBody>
       </p:sp>
@@ -11508,15 +11479,7 @@
           <a:p>
             <a:r>
               <a:rPr lang="en-US" altLang="ko-KR" dirty="0" smtClean="0"/>
-              <a:t>6. </a:t>
-            </a:r>
-            <a:r>
-              <a:rPr lang="en-US" altLang="ko-KR" dirty="0" smtClean="0"/>
-              <a:t>Merge(V</a:t>
-            </a:r>
-            <a:r>
-              <a:rPr lang="en-US" altLang="ko-KR" dirty="0" smtClean="0"/>
-              <a:t>)</a:t>
+              <a:t>6. Merge(V)</a:t>
             </a:r>
             <a:endParaRPr lang="ko-KR" altLang="en-US" dirty="0"/>
           </a:p>
@@ -11839,11 +11802,7 @@
           <a:p>
             <a:r>
               <a:rPr lang="en-US" altLang="ko-KR" dirty="0" smtClean="0"/>
-              <a:t>6. </a:t>
-            </a:r>
-            <a:r>
-              <a:rPr lang="en-US" altLang="ko-KR" dirty="0" smtClean="0"/>
-              <a:t>Merge(VI)</a:t>
+              <a:t>6. Merge(VI)</a:t>
             </a:r>
             <a:endParaRPr lang="ko-KR" altLang="en-US" dirty="0"/>
           </a:p>
@@ -12499,11 +12458,7 @@
             </a:pPr>
             <a:r>
               <a:rPr lang="en-US" altLang="ko-KR" dirty="0" smtClean="0"/>
-              <a:t>Fetch, Push, </a:t>
-            </a:r>
-            <a:r>
-              <a:rPr lang="en-US" altLang="ko-KR" dirty="0" smtClean="0"/>
-              <a:t>Pull</a:t>
+              <a:t>Fetch, Push, Pull</a:t>
             </a:r>
           </a:p>
           <a:p>
@@ -13546,7 +13501,6 @@
               <a:rPr lang="en-US" altLang="ko-KR" dirty="0" smtClean="0"/>
               <a:t>.</a:t>
             </a:r>
-            <a:endParaRPr lang="en-US" altLang="ko-KR" dirty="0" smtClean="0"/>
           </a:p>
           <a:p>
             <a:pPr lvl="1">
@@ -14227,11 +14181,7 @@
             </a:pPr>
             <a:r>
               <a:rPr lang="ko-KR" altLang="en-US" dirty="0" smtClean="0"/>
-              <a:t>소스컨트롤 </a:t>
-            </a:r>
-            <a:r>
-              <a:rPr lang="ko-KR" altLang="en-US" dirty="0" smtClean="0"/>
-              <a:t>사용</a:t>
+              <a:t>소스컨트롤 사용</a:t>
             </a:r>
             <a:endParaRPr lang="en-US" altLang="ko-KR" dirty="0" smtClean="0"/>
           </a:p>
@@ -15012,11 +14962,7 @@
             </a:r>
             <a:r>
               <a:rPr lang="en-US" altLang="ko-KR" dirty="0" smtClean="0"/>
-              <a:t> </a:t>
-            </a:r>
-            <a:r>
-              <a:rPr lang="en-US" altLang="ko-KR" dirty="0" smtClean="0"/>
-              <a:t>clone – </a:t>
+              <a:t> clone – </a:t>
             </a:r>
             <a:r>
               <a:rPr lang="ko-KR" altLang="en-US" dirty="0" smtClean="0"/>
@@ -15058,11 +15004,7 @@
             </a:r>
             <a:r>
               <a:rPr lang="ko-KR" altLang="en-US" dirty="0" smtClean="0"/>
-              <a:t> </a:t>
-            </a:r>
-            <a:r>
-              <a:rPr lang="ko-KR" altLang="en-US" dirty="0" smtClean="0"/>
-              <a:t>선택한다</a:t>
+              <a:t> 선택한다</a:t>
             </a:r>
             <a:r>
               <a:rPr lang="en-US" altLang="ko-KR" dirty="0" smtClean="0"/>
@@ -15390,11 +15332,7 @@
             </a:r>
             <a:r>
               <a:rPr lang="ko-KR" altLang="en-US" dirty="0" smtClean="0"/>
-              <a:t>탭에서 </a:t>
-            </a:r>
-            <a:r>
-              <a:rPr lang="ko-KR" altLang="en-US" dirty="0" smtClean="0"/>
-              <a:t>프로젝트에 쓰이는 파일이 표시된다</a:t>
+              <a:t>탭에서 프로젝트에 쓰이는 파일이 표시된다</a:t>
             </a:r>
             <a:r>
               <a:rPr lang="en-US" altLang="ko-KR" dirty="0" smtClean="0"/>
@@ -15500,11 +15438,7 @@
             </a:r>
             <a:r>
               <a:rPr lang="ko-KR" altLang="en-US" dirty="0" smtClean="0"/>
-              <a:t>에 </a:t>
-            </a:r>
-            <a:r>
-              <a:rPr lang="ko-KR" altLang="en-US" dirty="0" smtClean="0"/>
-              <a:t>파일이 표시된다</a:t>
+              <a:t>에 파일이 표시된다</a:t>
             </a:r>
             <a:r>
               <a:rPr lang="en-US" altLang="ko-KR" dirty="0" smtClean="0"/>
@@ -15547,7 +15481,6 @@
               <a:rPr lang="en-US" altLang="ko-KR" dirty="0" smtClean="0"/>
               <a:t>.</a:t>
             </a:r>
-            <a:endParaRPr lang="en-US" altLang="ko-KR" dirty="0" smtClean="0"/>
           </a:p>
         </p:txBody>
       </p:sp>
@@ -15827,11 +15760,7 @@
             </a:r>
             <a:r>
               <a:rPr lang="ko-KR" altLang="en-US" dirty="0" smtClean="0"/>
-              <a:t>가 </a:t>
-            </a:r>
-            <a:r>
-              <a:rPr lang="ko-KR" altLang="en-US" dirty="0" smtClean="0"/>
-              <a:t>생성되고</a:t>
+              <a:t>가 생성되고</a:t>
             </a:r>
             <a:r>
               <a:rPr lang="en-US" altLang="ko-KR" dirty="0" smtClean="0"/>
@@ -15839,11 +15768,7 @@
             </a:r>
             <a:r>
               <a:rPr lang="ko-KR" altLang="en-US" dirty="0" smtClean="0"/>
-              <a:t> </a:t>
-            </a:r>
-            <a:r>
-              <a:rPr lang="ko-KR" altLang="en-US" dirty="0" smtClean="0"/>
-              <a:t>이를 확인 할 수 있다</a:t>
+              <a:t> 이를 확인 할 수 있다</a:t>
             </a:r>
             <a:r>
               <a:rPr lang="en-US" altLang="ko-KR" dirty="0" smtClean="0"/>
@@ -16233,11 +16158,7 @@
             </a:r>
             <a:r>
               <a:rPr lang="ko-KR" altLang="en-US" dirty="0" smtClean="0"/>
-              <a:t> 태그 </a:t>
-            </a:r>
-            <a:r>
-              <a:rPr lang="ko-KR" altLang="en-US" dirty="0" smtClean="0"/>
-              <a:t>생성</a:t>
+              <a:t> 태그 생성</a:t>
             </a:r>
             <a:endParaRPr lang="en-US" altLang="ko-KR" dirty="0" smtClean="0"/>
           </a:p>
@@ -16271,11 +16192,7 @@
             </a:r>
             <a:r>
               <a:rPr lang="ko-KR" altLang="en-US" dirty="0" smtClean="0"/>
-              <a:t>를 </a:t>
-            </a:r>
-            <a:r>
-              <a:rPr lang="ko-KR" altLang="en-US" dirty="0" smtClean="0"/>
-              <a:t>생성</a:t>
+              <a:t>를 생성</a:t>
             </a:r>
             <a:endParaRPr lang="en-US" altLang="ko-KR" dirty="0" smtClean="0"/>
           </a:p>
@@ -16337,7 +16254,6 @@
               <a:rPr lang="en-US" altLang="ko-KR" dirty="0" smtClean="0"/>
               <a:t>.</a:t>
             </a:r>
-            <a:endParaRPr lang="en-US" altLang="ko-KR" dirty="0" smtClean="0"/>
           </a:p>
           <a:p>
             <a:pPr lvl="1">
@@ -16738,11 +16654,7 @@
             </a:pPr>
             <a:r>
               <a:rPr lang="ko-KR" altLang="en-US" dirty="0" smtClean="0"/>
-              <a:t>로컬 </a:t>
-            </a:r>
-            <a:r>
-              <a:rPr lang="ko-KR" altLang="en-US" dirty="0" smtClean="0"/>
-              <a:t>파일과 비교 </a:t>
+              <a:t>로컬 파일과 비교 </a:t>
             </a:r>
             <a:r>
               <a:rPr lang="en-US" altLang="ko-KR" dirty="0" smtClean="0"/>

</xml_diff>

<commit_message>
fix typo in source control 0203
</commit_message>
<xml_diff>
--- a/Simulink Source Control.pptx
+++ b/Simulink Source Control.pptx
@@ -6811,7 +6811,7 @@
           <a:p>
             <a:fld id="{F7419D33-7494-40C4-AC0B-AE730A9A4A91}" type="datetimeFigureOut">
               <a:rPr lang="ko-KR" altLang="en-US" smtClean="0"/>
-              <a:t>2020-01-03</a:t>
+              <a:t>2020-02-03</a:t>
             </a:fld>
             <a:endParaRPr lang="ko-KR" altLang="en-US"/>
           </a:p>
@@ -10623,12 +10623,12 @@
               <a:t>theirs, </a:t>
             </a:r>
             <a:r>
-              <a:rPr lang="en-US" altLang="ko-KR" dirty="0" err="1" smtClean="0"/>
-              <a:t>buttom</a:t>
-            </a:r>
-            <a:r>
-              <a:rPr lang="en-US" altLang="ko-KR" dirty="0" smtClean="0"/>
-              <a:t> model</a:t>
+              <a:rPr lang="en-US" altLang="ko-KR" dirty="0" smtClean="0"/>
+              <a:t>bottom </a:t>
+            </a:r>
+            <a:r>
+              <a:rPr lang="en-US" altLang="ko-KR" dirty="0" smtClean="0"/>
+              <a:t>model</a:t>
             </a:r>
             <a:r>
               <a:rPr lang="ko-KR" altLang="en-US" dirty="0" smtClean="0"/>
@@ -15125,7 +15125,7 @@
           <a:p>
             <a:r>
               <a:rPr lang="en-US" altLang="ko-KR" dirty="0" smtClean="0"/>
-              <a:t>1.Project </a:t>
+              <a:t>1. Project </a:t>
             </a:r>
             <a:r>
               <a:rPr lang="ko-KR" altLang="en-US" dirty="0" smtClean="0"/>
@@ -15695,6 +15695,13 @@
       </p:transition>
     </mc:Fallback>
   </mc:AlternateContent>
+  <p:timing>
+    <p:tnLst>
+      <p:par>
+        <p:cTn id="1" dur="indefinite" restart="never" nodeType="tmRoot"/>
+      </p:par>
+    </p:tnLst>
+  </p:timing>
 </p:sld>
 </file>
 
@@ -15936,6 +15943,13 @@
       </p:transition>
     </mc:Fallback>
   </mc:AlternateContent>
+  <p:timing>
+    <p:tnLst>
+      <p:par>
+        <p:cTn id="1" dur="indefinite" restart="never" nodeType="tmRoot"/>
+      </p:par>
+    </p:tnLst>
+  </p:timing>
 </p:sld>
 </file>
 
@@ -16530,6 +16544,13 @@
       </p:transition>
     </mc:Fallback>
   </mc:AlternateContent>
+  <p:timing>
+    <p:tnLst>
+      <p:par>
+        <p:cTn id="1" dur="indefinite" restart="never" nodeType="tmRoot"/>
+      </p:par>
+    </p:tnLst>
+  </p:timing>
 </p:sld>
 </file>
 
@@ -16817,6 +16838,13 @@
       </p:transition>
     </mc:Fallback>
   </mc:AlternateContent>
+  <p:timing>
+    <p:tnLst>
+      <p:par>
+        <p:cTn id="1" dur="indefinite" restart="never" nodeType="tmRoot"/>
+      </p:par>
+    </p:tnLst>
+  </p:timing>
 </p:sld>
 </file>
 

</xml_diff>